<commit_message>
Sprint 5 Presentation 4/21 Final Version
</commit_message>
<xml_diff>
--- a/Sprint 5.pptx
+++ b/Sprint 5.pptx
@@ -144,7 +144,10 @@
 <file path=ppt/revisionInfo.xml><?xml version="1.0" encoding="utf-8"?>
 <p1510:revInfo xmlns:a="http://schemas.openxmlformats.org/drawingml/2006/main" xmlns:r="http://schemas.openxmlformats.org/officeDocument/2006/relationships" xmlns:p1510="http://schemas.microsoft.com/office/powerpoint/2015/10/main">
   <p1510:revLst>
-    <p1510:client id="{7B76A15A-D293-4197-975B-FABF53BE268A}" v="413" dt="2025-04-18T21:52:26.057"/>
+    <p1510:client id="{152E347A-C123-4A0A-027D-9DDBF0E6676B}" v="1" dt="2025-04-21T10:14:58.030"/>
+    <p1510:client id="{AF320A14-E4C7-09A4-AA01-B9DE025F9DEF}" v="1" dt="2025-04-21T21:50:05.917"/>
+    <p1510:client id="{B9F1607A-1AD1-4054-B856-21822D253304}" v="123" dt="2025-04-21T22:09:01.728"/>
+    <p1510:client id="{D0F535AA-215D-4D9A-B45E-258A21789E7C}" v="2" dt="2025-04-21T15:56:42.995"/>
   </p1510:revLst>
 </p1510:revInfo>
 </file>
@@ -1093,6 +1096,313 @@
           </pc:sldLayoutMkLst>
         </pc:sldLayoutChg>
       </pc:sldMasterChg>
+    </pc:docChg>
+  </pc:docChgLst>
+  <pc:docChgLst>
+    <pc:chgData name="Siler, Heather Walker" userId="S::silerh00@students.ecu.edu::eee6b19a-496d-46a4-8f43-ff657359d800" providerId="AD" clId="Web-{AF320A14-E4C7-09A4-AA01-B9DE025F9DEF}"/>
+    <pc:docChg chg="modSld">
+      <pc:chgData name="Siler, Heather Walker" userId="S::silerh00@students.ecu.edu::eee6b19a-496d-46a4-8f43-ff657359d800" providerId="AD" clId="Web-{AF320A14-E4C7-09A4-AA01-B9DE025F9DEF}" dt="2025-04-21T21:50:05.917" v="0"/>
+      <pc:docMkLst>
+        <pc:docMk/>
+      </pc:docMkLst>
+      <pc:sldChg chg="mod modShow">
+        <pc:chgData name="Siler, Heather Walker" userId="S::silerh00@students.ecu.edu::eee6b19a-496d-46a4-8f43-ff657359d800" providerId="AD" clId="Web-{AF320A14-E4C7-09A4-AA01-B9DE025F9DEF}" dt="2025-04-21T21:50:05.917" v="0"/>
+        <pc:sldMkLst>
+          <pc:docMk/>
+          <pc:sldMk cId="2141314552" sldId="425"/>
+        </pc:sldMkLst>
+      </pc:sldChg>
+    </pc:docChg>
+  </pc:docChgLst>
+  <pc:docChgLst>
+    <pc:chgData name="Geis, Lauren" userId="5bbaa5d3-891f-4283-a4d4-96784db4f05a" providerId="ADAL" clId="{B9F1607A-1AD1-4054-B856-21822D253304}"/>
+    <pc:docChg chg="undo custSel modSld">
+      <pc:chgData name="Geis, Lauren" userId="5bbaa5d3-891f-4283-a4d4-96784db4f05a" providerId="ADAL" clId="{B9F1607A-1AD1-4054-B856-21822D253304}" dt="2025-04-21T22:09:01.728" v="119"/>
+      <pc:docMkLst>
+        <pc:docMk/>
+      </pc:docMkLst>
+      <pc:sldChg chg="modNotesTx">
+        <pc:chgData name="Geis, Lauren" userId="5bbaa5d3-891f-4283-a4d4-96784db4f05a" providerId="ADAL" clId="{B9F1607A-1AD1-4054-B856-21822D253304}" dt="2025-04-21T22:09:01.728" v="119"/>
+        <pc:sldMkLst>
+          <pc:docMk/>
+          <pc:sldMk cId="2182803241" sldId="382"/>
+        </pc:sldMkLst>
+      </pc:sldChg>
+      <pc:sldChg chg="modSp mod modNotesTx">
+        <pc:chgData name="Geis, Lauren" userId="5bbaa5d3-891f-4283-a4d4-96784db4f05a" providerId="ADAL" clId="{B9F1607A-1AD1-4054-B856-21822D253304}" dt="2025-04-21T22:08:53.551" v="117"/>
+        <pc:sldMkLst>
+          <pc:docMk/>
+          <pc:sldMk cId="1675092871" sldId="397"/>
+        </pc:sldMkLst>
+        <pc:graphicFrameChg chg="mod modGraphic">
+          <ac:chgData name="Geis, Lauren" userId="5bbaa5d3-891f-4283-a4d4-96784db4f05a" providerId="ADAL" clId="{B9F1607A-1AD1-4054-B856-21822D253304}" dt="2025-04-21T22:06:14.487" v="96"/>
+          <ac:graphicFrameMkLst>
+            <pc:docMk/>
+            <pc:sldMk cId="1675092871" sldId="397"/>
+            <ac:graphicFrameMk id="2" creationId="{26D82EF0-A40F-83ED-E974-D5E5D6F80EA2}"/>
+          </ac:graphicFrameMkLst>
+        </pc:graphicFrameChg>
+      </pc:sldChg>
+      <pc:sldChg chg="modNotesTx">
+        <pc:chgData name="Geis, Lauren" userId="5bbaa5d3-891f-4283-a4d4-96784db4f05a" providerId="ADAL" clId="{B9F1607A-1AD1-4054-B856-21822D253304}" dt="2025-04-21T22:08:58.615" v="118"/>
+        <pc:sldMkLst>
+          <pc:docMk/>
+          <pc:sldMk cId="396941368" sldId="398"/>
+        </pc:sldMkLst>
+      </pc:sldChg>
+      <pc:sldChg chg="modNotesTx">
+        <pc:chgData name="Geis, Lauren" userId="5bbaa5d3-891f-4283-a4d4-96784db4f05a" providerId="ADAL" clId="{B9F1607A-1AD1-4054-B856-21822D253304}" dt="2025-04-21T22:08:12.397" v="106"/>
+        <pc:sldMkLst>
+          <pc:docMk/>
+          <pc:sldMk cId="769519230" sldId="404"/>
+        </pc:sldMkLst>
+      </pc:sldChg>
+      <pc:sldChg chg="modNotesTx">
+        <pc:chgData name="Geis, Lauren" userId="5bbaa5d3-891f-4283-a4d4-96784db4f05a" providerId="ADAL" clId="{B9F1607A-1AD1-4054-B856-21822D253304}" dt="2025-04-21T22:08:09.557" v="105"/>
+        <pc:sldMkLst>
+          <pc:docMk/>
+          <pc:sldMk cId="1160567026" sldId="414"/>
+        </pc:sldMkLst>
+      </pc:sldChg>
+      <pc:sldChg chg="modSp mod modNotesTx">
+        <pc:chgData name="Geis, Lauren" userId="5bbaa5d3-891f-4283-a4d4-96784db4f05a" providerId="ADAL" clId="{B9F1607A-1AD1-4054-B856-21822D253304}" dt="2025-04-21T22:08:46.015" v="115"/>
+        <pc:sldMkLst>
+          <pc:docMk/>
+          <pc:sldMk cId="1378607343" sldId="415"/>
+        </pc:sldMkLst>
+        <pc:spChg chg="mod">
+          <ac:chgData name="Geis, Lauren" userId="5bbaa5d3-891f-4283-a4d4-96784db4f05a" providerId="ADAL" clId="{B9F1607A-1AD1-4054-B856-21822D253304}" dt="2025-04-21T21:58:49.095" v="9" actId="1076"/>
+          <ac:spMkLst>
+            <pc:docMk/>
+            <pc:sldMk cId="1378607343" sldId="415"/>
+            <ac:spMk id="8" creationId="{50BAC476-3BB4-05ED-6747-5531A18B9896}"/>
+          </ac:spMkLst>
+        </pc:spChg>
+      </pc:sldChg>
+      <pc:sldChg chg="addSp delSp modSp mod delAnim modAnim modNotesTx">
+        <pc:chgData name="Geis, Lauren" userId="5bbaa5d3-891f-4283-a4d4-96784db4f05a" providerId="ADAL" clId="{B9F1607A-1AD1-4054-B856-21822D253304}" dt="2025-04-21T22:08:38.869" v="114" actId="20577"/>
+        <pc:sldMkLst>
+          <pc:docMk/>
+          <pc:sldMk cId="2761924258" sldId="416"/>
+        </pc:sldMkLst>
+        <pc:spChg chg="add mod">
+          <ac:chgData name="Geis, Lauren" userId="5bbaa5d3-891f-4283-a4d4-96784db4f05a" providerId="ADAL" clId="{B9F1607A-1AD1-4054-B856-21822D253304}" dt="2025-04-21T21:59:09.353" v="13" actId="1076"/>
+          <ac:spMkLst>
+            <pc:docMk/>
+            <pc:sldMk cId="2761924258" sldId="416"/>
+            <ac:spMk id="2" creationId="{3502C76E-33F3-6D32-D5AF-4A50FF20CD20}"/>
+          </ac:spMkLst>
+        </pc:spChg>
+        <pc:spChg chg="del mod">
+          <ac:chgData name="Geis, Lauren" userId="5bbaa5d3-891f-4283-a4d4-96784db4f05a" providerId="ADAL" clId="{B9F1607A-1AD1-4054-B856-21822D253304}" dt="2025-04-21T21:58:31.384" v="7" actId="478"/>
+          <ac:spMkLst>
+            <pc:docMk/>
+            <pc:sldMk cId="2761924258" sldId="416"/>
+            <ac:spMk id="8" creationId="{0EFB8307-6C3B-1E57-42E2-1548D978FA63}"/>
+          </ac:spMkLst>
+        </pc:spChg>
+        <pc:spChg chg="del">
+          <ac:chgData name="Geis, Lauren" userId="5bbaa5d3-891f-4283-a4d4-96784db4f05a" providerId="ADAL" clId="{B9F1607A-1AD1-4054-B856-21822D253304}" dt="2025-04-21T21:58:35.211" v="8" actId="478"/>
+          <ac:spMkLst>
+            <pc:docMk/>
+            <pc:sldMk cId="2761924258" sldId="416"/>
+            <ac:spMk id="14" creationId="{1D5C4154-82C5-0B09-644C-48D7ACB3CC13}"/>
+          </ac:spMkLst>
+        </pc:spChg>
+        <pc:graphicFrameChg chg="mod">
+          <ac:chgData name="Geis, Lauren" userId="5bbaa5d3-891f-4283-a4d4-96784db4f05a" providerId="ADAL" clId="{B9F1607A-1AD1-4054-B856-21822D253304}" dt="2025-04-21T21:58:25.100" v="6" actId="1076"/>
+          <ac:graphicFrameMkLst>
+            <pc:docMk/>
+            <pc:sldMk cId="2761924258" sldId="416"/>
+            <ac:graphicFrameMk id="3" creationId="{DB04B16A-FEDE-CCFB-53A6-05EFF6EA9C46}"/>
+          </ac:graphicFrameMkLst>
+        </pc:graphicFrameChg>
+      </pc:sldChg>
+      <pc:sldChg chg="modSp mod modNotesTx">
+        <pc:chgData name="Geis, Lauren" userId="5bbaa5d3-891f-4283-a4d4-96784db4f05a" providerId="ADAL" clId="{B9F1607A-1AD1-4054-B856-21822D253304}" dt="2025-04-21T22:08:50.280" v="116"/>
+        <pc:sldMkLst>
+          <pc:docMk/>
+          <pc:sldMk cId="2622452897" sldId="418"/>
+        </pc:sldMkLst>
+        <pc:spChg chg="mod">
+          <ac:chgData name="Geis, Lauren" userId="5bbaa5d3-891f-4283-a4d4-96784db4f05a" providerId="ADAL" clId="{B9F1607A-1AD1-4054-B856-21822D253304}" dt="2025-04-21T21:58:55.817" v="10" actId="1076"/>
+          <ac:spMkLst>
+            <pc:docMk/>
+            <pc:sldMk cId="2622452897" sldId="418"/>
+            <ac:spMk id="8" creationId="{31A8592A-6F3C-7D8C-596B-F67991A3E6DB}"/>
+          </ac:spMkLst>
+        </pc:spChg>
+      </pc:sldChg>
+      <pc:sldChg chg="modNotesTx">
+        <pc:chgData name="Geis, Lauren" userId="5bbaa5d3-891f-4283-a4d4-96784db4f05a" providerId="ADAL" clId="{B9F1607A-1AD1-4054-B856-21822D253304}" dt="2025-04-21T22:08:31.520" v="107"/>
+        <pc:sldMkLst>
+          <pc:docMk/>
+          <pc:sldMk cId="673310539" sldId="419"/>
+        </pc:sldMkLst>
+      </pc:sldChg>
+      <pc:sldChg chg="modNotesTx">
+        <pc:chgData name="Geis, Lauren" userId="5bbaa5d3-891f-4283-a4d4-96784db4f05a" providerId="ADAL" clId="{B9F1607A-1AD1-4054-B856-21822D253304}" dt="2025-04-21T22:08:06.500" v="104"/>
+        <pc:sldMkLst>
+          <pc:docMk/>
+          <pc:sldMk cId="3044597063" sldId="424"/>
+        </pc:sldMkLst>
+      </pc:sldChg>
+      <pc:sldChg chg="modAnim modNotesTx">
+        <pc:chgData name="Geis, Lauren" userId="5bbaa5d3-891f-4283-a4d4-96784db4f05a" providerId="ADAL" clId="{B9F1607A-1AD1-4054-B856-21822D253304}" dt="2025-04-21T22:08:00.972" v="103" actId="20577"/>
+        <pc:sldMkLst>
+          <pc:docMk/>
+          <pc:sldMk cId="2141314552" sldId="425"/>
+        </pc:sldMkLst>
+      </pc:sldChg>
+    </pc:docChg>
+  </pc:docChgLst>
+  <pc:docChgLst>
+    <pc:chgData name="Clark, Hannah" userId="bd86e291-7d40-4fbf-ba77-72f20a2dd343" providerId="ADAL" clId="{D0F535AA-215D-4D9A-B45E-258A21789E7C}"/>
+    <pc:docChg chg="custSel modSld">
+      <pc:chgData name="Clark, Hannah" userId="bd86e291-7d40-4fbf-ba77-72f20a2dd343" providerId="ADAL" clId="{D0F535AA-215D-4D9A-B45E-258A21789E7C}" dt="2025-04-21T15:57:48.510" v="17" actId="14100"/>
+      <pc:docMkLst>
+        <pc:docMk/>
+      </pc:docMkLst>
+      <pc:sldChg chg="addSp delSp modSp mod setBg">
+        <pc:chgData name="Clark, Hannah" userId="bd86e291-7d40-4fbf-ba77-72f20a2dd343" providerId="ADAL" clId="{D0F535AA-215D-4D9A-B45E-258A21789E7C}" dt="2025-04-21T15:57:48.510" v="17" actId="14100"/>
+        <pc:sldMkLst>
+          <pc:docMk/>
+          <pc:sldMk cId="2141314552" sldId="425"/>
+        </pc:sldMkLst>
+        <pc:spChg chg="add del">
+          <ac:chgData name="Clark, Hannah" userId="bd86e291-7d40-4fbf-ba77-72f20a2dd343" providerId="ADAL" clId="{D0F535AA-215D-4D9A-B45E-258A21789E7C}" dt="2025-04-21T15:57:35.624" v="12" actId="26606"/>
+          <ac:spMkLst>
+            <pc:docMk/>
+            <pc:sldMk cId="2141314552" sldId="425"/>
+            <ac:spMk id="10" creationId="{9CAC3D59-B18E-47AC-BAC4-6D40C9C4F02C}"/>
+          </ac:spMkLst>
+        </pc:spChg>
+        <pc:spChg chg="add del">
+          <ac:chgData name="Clark, Hannah" userId="bd86e291-7d40-4fbf-ba77-72f20a2dd343" providerId="ADAL" clId="{D0F535AA-215D-4D9A-B45E-258A21789E7C}" dt="2025-04-21T15:57:35.624" v="12" actId="26606"/>
+          <ac:spMkLst>
+            <pc:docMk/>
+            <pc:sldMk cId="2141314552" sldId="425"/>
+            <ac:spMk id="12" creationId="{60D0E55C-3C32-4FD2-A2F8-EEA12C285143}"/>
+          </ac:spMkLst>
+        </pc:spChg>
+        <pc:spChg chg="add del">
+          <ac:chgData name="Clark, Hannah" userId="bd86e291-7d40-4fbf-ba77-72f20a2dd343" providerId="ADAL" clId="{D0F535AA-215D-4D9A-B45E-258A21789E7C}" dt="2025-04-21T15:57:35.624" v="12" actId="26606"/>
+          <ac:spMkLst>
+            <pc:docMk/>
+            <pc:sldMk cId="2141314552" sldId="425"/>
+            <ac:spMk id="14" creationId="{81FEC21E-102D-426A-9A93-48E62F37838F}"/>
+          </ac:spMkLst>
+        </pc:spChg>
+        <pc:picChg chg="add mod">
+          <ac:chgData name="Clark, Hannah" userId="bd86e291-7d40-4fbf-ba77-72f20a2dd343" providerId="ADAL" clId="{D0F535AA-215D-4D9A-B45E-258A21789E7C}" dt="2025-04-21T15:57:41.390" v="14" actId="14100"/>
+          <ac:picMkLst>
+            <pc:docMk/>
+            <pc:sldMk cId="2141314552" sldId="425"/>
+            <ac:picMk id="3" creationId="{AB5F41A8-8153-57B6-57CC-BC1BA9FBA260}"/>
+          </ac:picMkLst>
+        </pc:picChg>
+        <pc:picChg chg="add mod">
+          <ac:chgData name="Clark, Hannah" userId="bd86e291-7d40-4fbf-ba77-72f20a2dd343" providerId="ADAL" clId="{D0F535AA-215D-4D9A-B45E-258A21789E7C}" dt="2025-04-21T15:57:48.510" v="17" actId="14100"/>
+          <ac:picMkLst>
+            <pc:docMk/>
+            <pc:sldMk cId="2141314552" sldId="425"/>
+            <ac:picMk id="5" creationId="{5A42C47B-69D6-C7FA-DCF5-0195D45A08D0}"/>
+          </ac:picMkLst>
+        </pc:picChg>
+      </pc:sldChg>
+    </pc:docChg>
+  </pc:docChgLst>
+  <pc:docChgLst>
+    <pc:chgData name="Siler, Heather Walker" userId="S::silerh00@students.ecu.edu::eee6b19a-496d-46a4-8f43-ff657359d800" providerId="AD" clId="Web-{152E347A-C123-4A0A-027D-9DDBF0E6676B}"/>
+    <pc:docChg chg="modSld">
+      <pc:chgData name="Siler, Heather Walker" userId="S::silerh00@students.ecu.edu::eee6b19a-496d-46a4-8f43-ff657359d800" providerId="AD" clId="Web-{152E347A-C123-4A0A-027D-9DDBF0E6676B}" dt="2025-04-21T10:16:19.517" v="23"/>
+      <pc:docMkLst>
+        <pc:docMk/>
+      </pc:docMkLst>
+      <pc:sldChg chg="modNotes">
+        <pc:chgData name="Siler, Heather Walker" userId="S::silerh00@students.ecu.edu::eee6b19a-496d-46a4-8f43-ff657359d800" providerId="AD" clId="Web-{152E347A-C123-4A0A-027D-9DDBF0E6676B}" dt="2025-04-21T10:15:06.843" v="3"/>
+        <pc:sldMkLst>
+          <pc:docMk/>
+          <pc:sldMk cId="466565947" sldId="360"/>
+        </pc:sldMkLst>
+      </pc:sldChg>
+      <pc:sldChg chg="modNotes">
+        <pc:chgData name="Siler, Heather Walker" userId="S::silerh00@students.ecu.edu::eee6b19a-496d-46a4-8f43-ff657359d800" providerId="AD" clId="Web-{152E347A-C123-4A0A-027D-9DDBF0E6676B}" dt="2025-04-21T10:14:57.514" v="1"/>
+        <pc:sldMkLst>
+          <pc:docMk/>
+          <pc:sldMk cId="2182803241" sldId="382"/>
+        </pc:sldMkLst>
+      </pc:sldChg>
+      <pc:sldChg chg="modNotes">
+        <pc:chgData name="Siler, Heather Walker" userId="S::silerh00@students.ecu.edu::eee6b19a-496d-46a4-8f43-ff657359d800" providerId="AD" clId="Web-{152E347A-C123-4A0A-027D-9DDBF0E6676B}" dt="2025-04-21T10:15:19.577" v="7"/>
+        <pc:sldMkLst>
+          <pc:docMk/>
+          <pc:sldMk cId="1675092871" sldId="397"/>
+        </pc:sldMkLst>
+      </pc:sldChg>
+      <pc:sldChg chg="modNotes">
+        <pc:chgData name="Siler, Heather Walker" userId="S::silerh00@students.ecu.edu::eee6b19a-496d-46a4-8f43-ff657359d800" providerId="AD" clId="Web-{152E347A-C123-4A0A-027D-9DDBF0E6676B}" dt="2025-04-21T10:15:13.780" v="5"/>
+        <pc:sldMkLst>
+          <pc:docMk/>
+          <pc:sldMk cId="396941368" sldId="398"/>
+        </pc:sldMkLst>
+      </pc:sldChg>
+      <pc:sldChg chg="modNotes">
+        <pc:chgData name="Siler, Heather Walker" userId="S::silerh00@students.ecu.edu::eee6b19a-496d-46a4-8f43-ff657359d800" providerId="AD" clId="Web-{152E347A-C123-4A0A-027D-9DDBF0E6676B}" dt="2025-04-21T10:15:46.375" v="17"/>
+        <pc:sldMkLst>
+          <pc:docMk/>
+          <pc:sldMk cId="769519230" sldId="404"/>
+        </pc:sldMkLst>
+      </pc:sldChg>
+      <pc:sldChg chg="modNotes">
+        <pc:chgData name="Siler, Heather Walker" userId="S::silerh00@students.ecu.edu::eee6b19a-496d-46a4-8f43-ff657359d800" providerId="AD" clId="Web-{152E347A-C123-4A0A-027D-9DDBF0E6676B}" dt="2025-04-21T10:15:50.516" v="19"/>
+        <pc:sldMkLst>
+          <pc:docMk/>
+          <pc:sldMk cId="1160567026" sldId="414"/>
+        </pc:sldMkLst>
+      </pc:sldChg>
+      <pc:sldChg chg="modNotes">
+        <pc:chgData name="Siler, Heather Walker" userId="S::silerh00@students.ecu.edu::eee6b19a-496d-46a4-8f43-ff657359d800" providerId="AD" clId="Web-{152E347A-C123-4A0A-027D-9DDBF0E6676B}" dt="2025-04-21T10:15:30.156" v="11"/>
+        <pc:sldMkLst>
+          <pc:docMk/>
+          <pc:sldMk cId="1378607343" sldId="415"/>
+        </pc:sldMkLst>
+      </pc:sldChg>
+      <pc:sldChg chg="modNotes">
+        <pc:chgData name="Siler, Heather Walker" userId="S::silerh00@students.ecu.edu::eee6b19a-496d-46a4-8f43-ff657359d800" providerId="AD" clId="Web-{152E347A-C123-4A0A-027D-9DDBF0E6676B}" dt="2025-04-21T10:15:35.297" v="13"/>
+        <pc:sldMkLst>
+          <pc:docMk/>
+          <pc:sldMk cId="2761924258" sldId="416"/>
+        </pc:sldMkLst>
+      </pc:sldChg>
+      <pc:sldChg chg="modNotes">
+        <pc:chgData name="Siler, Heather Walker" userId="S::silerh00@students.ecu.edu::eee6b19a-496d-46a4-8f43-ff657359d800" providerId="AD" clId="Web-{152E347A-C123-4A0A-027D-9DDBF0E6676B}" dt="2025-04-21T10:15:25.218" v="9"/>
+        <pc:sldMkLst>
+          <pc:docMk/>
+          <pc:sldMk cId="2622452897" sldId="418"/>
+        </pc:sldMkLst>
+      </pc:sldChg>
+      <pc:sldChg chg="modNotes">
+        <pc:chgData name="Siler, Heather Walker" userId="S::silerh00@students.ecu.edu::eee6b19a-496d-46a4-8f43-ff657359d800" providerId="AD" clId="Web-{152E347A-C123-4A0A-027D-9DDBF0E6676B}" dt="2025-04-21T10:15:41.625" v="15"/>
+        <pc:sldMkLst>
+          <pc:docMk/>
+          <pc:sldMk cId="617453865" sldId="423"/>
+        </pc:sldMkLst>
+      </pc:sldChg>
+      <pc:sldChg chg="modNotes">
+        <pc:chgData name="Siler, Heather Walker" userId="S::silerh00@students.ecu.edu::eee6b19a-496d-46a4-8f43-ff657359d800" providerId="AD" clId="Web-{152E347A-C123-4A0A-027D-9DDBF0E6676B}" dt="2025-04-21T10:15:55.438" v="21"/>
+        <pc:sldMkLst>
+          <pc:docMk/>
+          <pc:sldMk cId="3044597063" sldId="424"/>
+        </pc:sldMkLst>
+      </pc:sldChg>
+      <pc:sldChg chg="modNotes">
+        <pc:chgData name="Siler, Heather Walker" userId="S::silerh00@students.ecu.edu::eee6b19a-496d-46a4-8f43-ff657359d800" providerId="AD" clId="Web-{152E347A-C123-4A0A-027D-9DDBF0E6676B}" dt="2025-04-21T10:16:19.517" v="23"/>
+        <pc:sldMkLst>
+          <pc:docMk/>
+          <pc:sldMk cId="2141314552" sldId="425"/>
+        </pc:sldMkLst>
+      </pc:sldChg>
     </pc:docChg>
   </pc:docChgLst>
 </pc:chgInfo>
@@ -3257,25 +3567,34 @@
         <a:lstStyle/>
         <a:p>
           <a:r>
-            <a:rPr lang="en-US" sz="2000" b="0" dirty="0"/>
+            <a:rPr lang="en-US" sz="1800" b="0" dirty="0"/>
             <a:t>-Go-Live Verification</a:t>
           </a:r>
         </a:p>
         <a:p>
+          <a:endParaRPr lang="en-US" sz="1800" b="0" dirty="0"/>
+        </a:p>
+        <a:p>
           <a:r>
-            <a:rPr lang="en-US" sz="2000" b="0" dirty="0"/>
+            <a:rPr lang="en-US" sz="1800" b="0" dirty="0"/>
             <a:t>-Parallel Run Monitoring</a:t>
           </a:r>
         </a:p>
         <a:p>
+          <a:endParaRPr lang="en-US" sz="1800" b="0" dirty="0"/>
+        </a:p>
+        <a:p>
           <a:r>
-            <a:rPr lang="en-US" sz="2000" b="0" dirty="0"/>
+            <a:rPr lang="en-US" sz="1800" b="0" dirty="0"/>
             <a:t>-Business Process Monitoring</a:t>
           </a:r>
         </a:p>
         <a:p>
+          <a:endParaRPr lang="en-US" sz="1800" b="0" dirty="0"/>
+        </a:p>
+        <a:p>
           <a:r>
-            <a:rPr lang="en-US" sz="2000" b="0" dirty="0"/>
+            <a:rPr lang="en-US" sz="1800" b="0" dirty="0"/>
             <a:t>-Stakeholder Communication</a:t>
           </a:r>
         </a:p>
@@ -3364,25 +3683,34 @@
         <a:lstStyle/>
         <a:p>
           <a:r>
-            <a:rPr lang="en-US" sz="2000" dirty="0"/>
+            <a:rPr lang="en-US" sz="1800" dirty="0"/>
             <a:t>-System Performance Monitoring</a:t>
           </a:r>
         </a:p>
         <a:p>
+          <a:endParaRPr lang="en-US" sz="1800" dirty="0"/>
+        </a:p>
+        <a:p>
           <a:r>
-            <a:rPr lang="en-US" sz="2000" dirty="0"/>
+            <a:rPr lang="en-US" sz="1800" dirty="0"/>
             <a:t>-Infrastructure Stability Checks</a:t>
           </a:r>
         </a:p>
         <a:p>
+          <a:endParaRPr lang="en-US" sz="1800" dirty="0"/>
+        </a:p>
+        <a:p>
           <a:r>
-            <a:rPr lang="en-US" sz="2000" dirty="0"/>
+            <a:rPr lang="en-US" sz="1800" dirty="0"/>
             <a:t>-Security Monitoring</a:t>
           </a:r>
         </a:p>
         <a:p>
+          <a:endParaRPr lang="en-US" sz="1800" dirty="0"/>
+        </a:p>
+        <a:p>
           <a:r>
-            <a:rPr lang="en-US" sz="2000" dirty="0"/>
+            <a:rPr lang="en-US" sz="1800" dirty="0"/>
             <a:t>-Log Analysis</a:t>
           </a:r>
         </a:p>
@@ -3471,25 +3799,34 @@
         <a:lstStyle/>
         <a:p>
           <a:r>
-            <a:rPr lang="en-US" sz="2000" dirty="0"/>
+            <a:rPr lang="en-US" sz="1800" dirty="0"/>
             <a:t>-Go-Live Support</a:t>
           </a:r>
         </a:p>
         <a:p>
+          <a:endParaRPr lang="en-US" sz="1800" dirty="0"/>
+        </a:p>
+        <a:p>
           <a:r>
-            <a:rPr lang="en-US" sz="2000" dirty="0"/>
+            <a:rPr lang="en-US" sz="1800" dirty="0"/>
             <a:t>-User Feedback</a:t>
           </a:r>
         </a:p>
         <a:p>
+          <a:endParaRPr lang="en-US" sz="1800" dirty="0"/>
+        </a:p>
+        <a:p>
           <a:r>
-            <a:rPr lang="en-US" sz="2000" dirty="0"/>
+            <a:rPr lang="en-US" sz="1800" dirty="0"/>
             <a:t>-Refresher Training</a:t>
           </a:r>
         </a:p>
         <a:p>
+          <a:endParaRPr lang="en-US" sz="1800" dirty="0"/>
+        </a:p>
+        <a:p>
           <a:r>
-            <a:rPr lang="en-US" sz="2000" dirty="0"/>
+            <a:rPr lang="en-US" sz="1800" dirty="0"/>
             <a:t>-Knowledge Transfer</a:t>
           </a:r>
         </a:p>
@@ -3539,7 +3876,7 @@
       <dgm:spPr/>
     </dgm:pt>
     <dgm:pt modelId="{C97AB44E-C3E5-4793-A0DB-D6ADAF13A430}" type="pres">
-      <dgm:prSet presAssocID="{BE63F9BB-37C9-4615-B327-18E1FBC82782}" presName="childText1" presStyleLbl="solidAlignAcc1" presStyleIdx="0" presStyleCnt="3" custScaleY="74264" custLinFactNeighborX="-316" custLinFactNeighborY="-14209">
+      <dgm:prSet presAssocID="{BE63F9BB-37C9-4615-B327-18E1FBC82782}" presName="childText1" presStyleLbl="solidAlignAcc1" presStyleIdx="0" presStyleCnt="3" custScaleY="94297" custLinFactNeighborX="-12" custLinFactNeighborY="-4886">
         <dgm:presLayoutVars>
           <dgm:chMax val="0"/>
           <dgm:chPref val="0"/>
@@ -3559,7 +3896,7 @@
       <dgm:spPr/>
     </dgm:pt>
     <dgm:pt modelId="{6C5AB759-FB06-44A2-B5EA-40C1B8F6930E}" type="pres">
-      <dgm:prSet presAssocID="{0FD05FBB-2F8C-4D6E-8619-B9584CF3F942}" presName="childText2" presStyleLbl="solidAlignAcc1" presStyleIdx="1" presStyleCnt="3" custScaleY="74314" custLinFactNeighborY="-14556">
+      <dgm:prSet presAssocID="{0FD05FBB-2F8C-4D6E-8619-B9584CF3F942}" presName="childText2" presStyleLbl="solidAlignAcc1" presStyleIdx="1" presStyleCnt="3" custScaleY="95409" custLinFactNeighborX="607" custLinFactNeighborY="-3261">
         <dgm:presLayoutVars>
           <dgm:chMax val="0"/>
           <dgm:chPref val="0"/>
@@ -3579,7 +3916,7 @@
       <dgm:spPr/>
     </dgm:pt>
     <dgm:pt modelId="{42F6FABD-EF2D-489D-9A41-3B41F142164C}" type="pres">
-      <dgm:prSet presAssocID="{3AC13ECB-FA05-4912-A46F-7292FC67E625}" presName="childText3" presStyleLbl="solidAlignAcc1" presStyleIdx="2" presStyleCnt="3" custScaleY="57905" custLinFactNeighborX="316" custLinFactNeighborY="-21103">
+      <dgm:prSet presAssocID="{3AC13ECB-FA05-4912-A46F-7292FC67E625}" presName="childText3" presStyleLbl="solidAlignAcc1" presStyleIdx="2" presStyleCnt="3" custScaleY="82167" custLinFactNeighborX="618" custLinFactNeighborY="-8785">
         <dgm:presLayoutVars>
           <dgm:chMax val="0"/>
           <dgm:chPref val="0"/>
@@ -4513,7 +4850,7 @@
       </dsp:nvSpPr>
       <dsp:spPr>
         <a:xfrm>
-          <a:off x="425034" y="311349"/>
+          <a:off x="425034" y="138578"/>
           <a:ext cx="10303706" cy="1500612"/>
         </a:xfrm>
         <a:prstGeom prst="rightArrow">
@@ -4583,7 +4920,7 @@
         </a:p>
       </dsp:txBody>
       <dsp:txXfrm>
-        <a:off x="425034" y="686502"/>
+        <a:off x="425034" y="513731"/>
         <a:ext cx="9928553" cy="750306"/>
       </dsp:txXfrm>
     </dsp:sp>
@@ -4594,8 +4931,8 @@
       </dsp:nvSpPr>
       <dsp:spPr>
         <a:xfrm>
-          <a:off x="415005" y="1429773"/>
-          <a:ext cx="3173541" cy="2146773"/>
+          <a:off x="424653" y="1236955"/>
+          <a:ext cx="3173541" cy="2725873"/>
         </a:xfrm>
         <a:prstGeom prst="rect">
           <a:avLst/>
@@ -4626,12 +4963,12 @@
         <a:fontRef idx="minor"/>
       </dsp:style>
       <dsp:txBody>
-        <a:bodyPr spcFirstLastPara="0" vert="horz" wrap="square" lIns="76200" tIns="76200" rIns="76200" bIns="76200" numCol="1" spcCol="1270" anchor="t" anchorCtr="0">
+        <a:bodyPr spcFirstLastPara="0" vert="horz" wrap="square" lIns="68580" tIns="68580" rIns="68580" bIns="68580" numCol="1" spcCol="1270" anchor="t" anchorCtr="0">
           <a:noAutofit/>
         </a:bodyPr>
         <a:lstStyle/>
         <a:p>
-          <a:pPr marL="0" lvl="0" indent="0" algn="l" defTabSz="889000">
+          <a:pPr marL="0" lvl="0" indent="0" algn="l" defTabSz="800100">
             <a:lnSpc>
               <a:spcPct val="90000"/>
             </a:lnSpc>
@@ -4644,12 +4981,27 @@
             <a:buNone/>
           </a:pPr>
           <a:r>
-            <a:rPr lang="en-US" sz="2000" b="0" kern="1200" dirty="0"/>
+            <a:rPr lang="en-US" sz="1800" b="0" kern="1200" dirty="0"/>
             <a:t>-Go-Live Verification</a:t>
           </a:r>
         </a:p>
         <a:p>
-          <a:pPr marL="0" lvl="0" indent="0" algn="l" defTabSz="889000">
+          <a:pPr marL="0" lvl="0" indent="0" algn="l" defTabSz="800100">
+            <a:lnSpc>
+              <a:spcPct val="90000"/>
+            </a:lnSpc>
+            <a:spcBef>
+              <a:spcPct val="0"/>
+            </a:spcBef>
+            <a:spcAft>
+              <a:spcPct val="35000"/>
+            </a:spcAft>
+            <a:buNone/>
+          </a:pPr>
+          <a:endParaRPr lang="en-US" sz="1800" b="0" kern="1200" dirty="0"/>
+        </a:p>
+        <a:p>
+          <a:pPr marL="0" lvl="0" indent="0" algn="l" defTabSz="800100">
             <a:lnSpc>
               <a:spcPct val="90000"/>
             </a:lnSpc>
@@ -4662,12 +5014,27 @@
             <a:buNone/>
           </a:pPr>
           <a:r>
-            <a:rPr lang="en-US" sz="2000" b="0" kern="1200" dirty="0"/>
+            <a:rPr lang="en-US" sz="1800" b="0" kern="1200" dirty="0"/>
             <a:t>-Parallel Run Monitoring</a:t>
           </a:r>
         </a:p>
         <a:p>
-          <a:pPr marL="0" lvl="0" indent="0" algn="l" defTabSz="889000">
+          <a:pPr marL="0" lvl="0" indent="0" algn="l" defTabSz="800100">
+            <a:lnSpc>
+              <a:spcPct val="90000"/>
+            </a:lnSpc>
+            <a:spcBef>
+              <a:spcPct val="0"/>
+            </a:spcBef>
+            <a:spcAft>
+              <a:spcPct val="35000"/>
+            </a:spcAft>
+            <a:buNone/>
+          </a:pPr>
+          <a:endParaRPr lang="en-US" sz="1800" b="0" kern="1200" dirty="0"/>
+        </a:p>
+        <a:p>
+          <a:pPr marL="0" lvl="0" indent="0" algn="l" defTabSz="800100">
             <a:lnSpc>
               <a:spcPct val="90000"/>
             </a:lnSpc>
@@ -4680,12 +5047,27 @@
             <a:buNone/>
           </a:pPr>
           <a:r>
-            <a:rPr lang="en-US" sz="2000" b="0" kern="1200" dirty="0"/>
+            <a:rPr lang="en-US" sz="1800" b="0" kern="1200" dirty="0"/>
             <a:t>-Business Process Monitoring</a:t>
           </a:r>
         </a:p>
         <a:p>
-          <a:pPr marL="0" lvl="0" indent="0" algn="l" defTabSz="889000">
+          <a:pPr marL="0" lvl="0" indent="0" algn="l" defTabSz="800100">
+            <a:lnSpc>
+              <a:spcPct val="90000"/>
+            </a:lnSpc>
+            <a:spcBef>
+              <a:spcPct val="0"/>
+            </a:spcBef>
+            <a:spcAft>
+              <a:spcPct val="35000"/>
+            </a:spcAft>
+            <a:buNone/>
+          </a:pPr>
+          <a:endParaRPr lang="en-US" sz="1800" b="0" kern="1200" dirty="0"/>
+        </a:p>
+        <a:p>
+          <a:pPr marL="0" lvl="0" indent="0" algn="l" defTabSz="800100">
             <a:lnSpc>
               <a:spcPct val="90000"/>
             </a:lnSpc>
@@ -4698,14 +5080,14 @@
             <a:buNone/>
           </a:pPr>
           <a:r>
-            <a:rPr lang="en-US" sz="2000" b="0" kern="1200" dirty="0"/>
+            <a:rPr lang="en-US" sz="1800" b="0" kern="1200" dirty="0"/>
             <a:t>-Stakeholder Communication</a:t>
           </a:r>
         </a:p>
       </dsp:txBody>
       <dsp:txXfrm>
-        <a:off x="415005" y="1429773"/>
-        <a:ext cx="3173541" cy="2146773"/>
+        <a:off x="424653" y="1236955"/>
+        <a:ext cx="3173541" cy="2725873"/>
       </dsp:txXfrm>
     </dsp:sp>
     <dsp:sp modelId="{EFCD1178-D824-4E42-B9F9-21A55C56B314}">
@@ -4715,7 +5097,7 @@
       </dsp:nvSpPr>
       <dsp:spPr>
         <a:xfrm>
-          <a:off x="3598575" y="811553"/>
+          <a:off x="3598575" y="638782"/>
           <a:ext cx="7130165" cy="1500612"/>
         </a:xfrm>
         <a:prstGeom prst="rightArrow">
@@ -4783,7 +5165,7 @@
         </a:p>
       </dsp:txBody>
       <dsp:txXfrm>
-        <a:off x="3598575" y="1186706"/>
+        <a:off x="3598575" y="1013935"/>
         <a:ext cx="6755012" cy="750306"/>
       </dsp:txXfrm>
     </dsp:sp>
@@ -4794,8 +5176,8 @@
       </dsp:nvSpPr>
       <dsp:spPr>
         <a:xfrm>
-          <a:off x="3598575" y="1919224"/>
-          <a:ext cx="3173541" cy="2148218"/>
+          <a:off x="3617839" y="1768061"/>
+          <a:ext cx="3173541" cy="2758018"/>
         </a:xfrm>
         <a:prstGeom prst="rect">
           <a:avLst/>
@@ -4824,12 +5206,12 @@
         <a:fontRef idx="minor"/>
       </dsp:style>
       <dsp:txBody>
-        <a:bodyPr spcFirstLastPara="0" vert="horz" wrap="square" lIns="76200" tIns="76200" rIns="76200" bIns="76200" numCol="1" spcCol="1270" anchor="t" anchorCtr="0">
+        <a:bodyPr spcFirstLastPara="0" vert="horz" wrap="square" lIns="68580" tIns="68580" rIns="68580" bIns="68580" numCol="1" spcCol="1270" anchor="t" anchorCtr="0">
           <a:noAutofit/>
         </a:bodyPr>
         <a:lstStyle/>
         <a:p>
-          <a:pPr marL="0" lvl="0" indent="0" algn="l" defTabSz="889000">
+          <a:pPr marL="0" lvl="0" indent="0" algn="l" defTabSz="800100">
             <a:lnSpc>
               <a:spcPct val="90000"/>
             </a:lnSpc>
@@ -4842,12 +5224,27 @@
             <a:buNone/>
           </a:pPr>
           <a:r>
-            <a:rPr lang="en-US" sz="2000" kern="1200" dirty="0"/>
+            <a:rPr lang="en-US" sz="1800" kern="1200" dirty="0"/>
             <a:t>-System Performance Monitoring</a:t>
           </a:r>
         </a:p>
         <a:p>
-          <a:pPr marL="0" lvl="0" indent="0" algn="l" defTabSz="889000">
+          <a:pPr marL="0" lvl="0" indent="0" algn="l" defTabSz="800100">
+            <a:lnSpc>
+              <a:spcPct val="90000"/>
+            </a:lnSpc>
+            <a:spcBef>
+              <a:spcPct val="0"/>
+            </a:spcBef>
+            <a:spcAft>
+              <a:spcPct val="35000"/>
+            </a:spcAft>
+            <a:buNone/>
+          </a:pPr>
+          <a:endParaRPr lang="en-US" sz="1800" kern="1200" dirty="0"/>
+        </a:p>
+        <a:p>
+          <a:pPr marL="0" lvl="0" indent="0" algn="l" defTabSz="800100">
             <a:lnSpc>
               <a:spcPct val="90000"/>
             </a:lnSpc>
@@ -4860,12 +5257,27 @@
             <a:buNone/>
           </a:pPr>
           <a:r>
-            <a:rPr lang="en-US" sz="2000" kern="1200" dirty="0"/>
+            <a:rPr lang="en-US" sz="1800" kern="1200" dirty="0"/>
             <a:t>-Infrastructure Stability Checks</a:t>
           </a:r>
         </a:p>
         <a:p>
-          <a:pPr marL="0" lvl="0" indent="0" algn="l" defTabSz="889000">
+          <a:pPr marL="0" lvl="0" indent="0" algn="l" defTabSz="800100">
+            <a:lnSpc>
+              <a:spcPct val="90000"/>
+            </a:lnSpc>
+            <a:spcBef>
+              <a:spcPct val="0"/>
+            </a:spcBef>
+            <a:spcAft>
+              <a:spcPct val="35000"/>
+            </a:spcAft>
+            <a:buNone/>
+          </a:pPr>
+          <a:endParaRPr lang="en-US" sz="1800" kern="1200" dirty="0"/>
+        </a:p>
+        <a:p>
+          <a:pPr marL="0" lvl="0" indent="0" algn="l" defTabSz="800100">
             <a:lnSpc>
               <a:spcPct val="90000"/>
             </a:lnSpc>
@@ -4878,12 +5290,27 @@
             <a:buNone/>
           </a:pPr>
           <a:r>
-            <a:rPr lang="en-US" sz="2000" kern="1200" dirty="0"/>
+            <a:rPr lang="en-US" sz="1800" kern="1200" dirty="0"/>
             <a:t>-Security Monitoring</a:t>
           </a:r>
         </a:p>
         <a:p>
-          <a:pPr marL="0" lvl="0" indent="0" algn="l" defTabSz="889000">
+          <a:pPr marL="0" lvl="0" indent="0" algn="l" defTabSz="800100">
+            <a:lnSpc>
+              <a:spcPct val="90000"/>
+            </a:lnSpc>
+            <a:spcBef>
+              <a:spcPct val="0"/>
+            </a:spcBef>
+            <a:spcAft>
+              <a:spcPct val="35000"/>
+            </a:spcAft>
+            <a:buNone/>
+          </a:pPr>
+          <a:endParaRPr lang="en-US" sz="1800" kern="1200" dirty="0"/>
+        </a:p>
+        <a:p>
+          <a:pPr marL="0" lvl="0" indent="0" algn="l" defTabSz="800100">
             <a:lnSpc>
               <a:spcPct val="90000"/>
             </a:lnSpc>
@@ -4896,14 +5323,14 @@
             <a:buNone/>
           </a:pPr>
           <a:r>
-            <a:rPr lang="en-US" sz="2000" kern="1200" dirty="0"/>
+            <a:rPr lang="en-US" sz="1800" kern="1200" dirty="0"/>
             <a:t>-Log Analysis</a:t>
           </a:r>
         </a:p>
       </dsp:txBody>
       <dsp:txXfrm>
-        <a:off x="3598575" y="1919224"/>
-        <a:ext cx="3173541" cy="2148218"/>
+        <a:off x="3617839" y="1768061"/>
+        <a:ext cx="3173541" cy="2758018"/>
       </dsp:txXfrm>
     </dsp:sp>
     <dsp:sp modelId="{B2DBA90D-4101-4C52-812E-160FA6475EB4}">
@@ -4913,7 +5340,7 @@
       </dsp:nvSpPr>
       <dsp:spPr>
         <a:xfrm>
-          <a:off x="6772117" y="1311758"/>
+          <a:off x="6772117" y="1138986"/>
           <a:ext cx="3956623" cy="1500612"/>
         </a:xfrm>
         <a:prstGeom prst="rightArrow">
@@ -4981,7 +5408,7 @@
         </a:p>
       </dsp:txBody>
       <dsp:txXfrm>
-        <a:off x="6772117" y="1686911"/>
+        <a:off x="6772117" y="1514139"/>
         <a:ext cx="3581470" cy="750306"/>
       </dsp:txXfrm>
     </dsp:sp>
@@ -4992,8 +5419,8 @@
       </dsp:nvSpPr>
       <dsp:spPr>
         <a:xfrm>
-          <a:off x="6782145" y="2467365"/>
-          <a:ext cx="3173541" cy="1649381"/>
+          <a:off x="6791729" y="2299921"/>
+          <a:ext cx="3173541" cy="2340466"/>
         </a:xfrm>
         <a:prstGeom prst="rect">
           <a:avLst/>
@@ -5022,12 +5449,12 @@
         <a:fontRef idx="minor"/>
       </dsp:style>
       <dsp:txBody>
-        <a:bodyPr spcFirstLastPara="0" vert="horz" wrap="square" lIns="76200" tIns="76200" rIns="76200" bIns="76200" numCol="1" spcCol="1270" anchor="t" anchorCtr="0">
+        <a:bodyPr spcFirstLastPara="0" vert="horz" wrap="square" lIns="68580" tIns="68580" rIns="68580" bIns="68580" numCol="1" spcCol="1270" anchor="t" anchorCtr="0">
           <a:noAutofit/>
         </a:bodyPr>
         <a:lstStyle/>
         <a:p>
-          <a:pPr marL="0" lvl="0" indent="0" algn="l" defTabSz="889000">
+          <a:pPr marL="0" lvl="0" indent="0" algn="l" defTabSz="800100">
             <a:lnSpc>
               <a:spcPct val="90000"/>
             </a:lnSpc>
@@ -5040,12 +5467,27 @@
             <a:buNone/>
           </a:pPr>
           <a:r>
-            <a:rPr lang="en-US" sz="2000" kern="1200" dirty="0"/>
+            <a:rPr lang="en-US" sz="1800" kern="1200" dirty="0"/>
             <a:t>-Go-Live Support</a:t>
           </a:r>
         </a:p>
         <a:p>
-          <a:pPr marL="0" lvl="0" indent="0" algn="l" defTabSz="889000">
+          <a:pPr marL="0" lvl="0" indent="0" algn="l" defTabSz="800100">
+            <a:lnSpc>
+              <a:spcPct val="90000"/>
+            </a:lnSpc>
+            <a:spcBef>
+              <a:spcPct val="0"/>
+            </a:spcBef>
+            <a:spcAft>
+              <a:spcPct val="35000"/>
+            </a:spcAft>
+            <a:buNone/>
+          </a:pPr>
+          <a:endParaRPr lang="en-US" sz="1800" kern="1200" dirty="0"/>
+        </a:p>
+        <a:p>
+          <a:pPr marL="0" lvl="0" indent="0" algn="l" defTabSz="800100">
             <a:lnSpc>
               <a:spcPct val="90000"/>
             </a:lnSpc>
@@ -5058,12 +5500,27 @@
             <a:buNone/>
           </a:pPr>
           <a:r>
-            <a:rPr lang="en-US" sz="2000" kern="1200" dirty="0"/>
+            <a:rPr lang="en-US" sz="1800" kern="1200" dirty="0"/>
             <a:t>-User Feedback</a:t>
           </a:r>
         </a:p>
         <a:p>
-          <a:pPr marL="0" lvl="0" indent="0" algn="l" defTabSz="889000">
+          <a:pPr marL="0" lvl="0" indent="0" algn="l" defTabSz="800100">
+            <a:lnSpc>
+              <a:spcPct val="90000"/>
+            </a:lnSpc>
+            <a:spcBef>
+              <a:spcPct val="0"/>
+            </a:spcBef>
+            <a:spcAft>
+              <a:spcPct val="35000"/>
+            </a:spcAft>
+            <a:buNone/>
+          </a:pPr>
+          <a:endParaRPr lang="en-US" sz="1800" kern="1200" dirty="0"/>
+        </a:p>
+        <a:p>
+          <a:pPr marL="0" lvl="0" indent="0" algn="l" defTabSz="800100">
             <a:lnSpc>
               <a:spcPct val="90000"/>
             </a:lnSpc>
@@ -5076,12 +5533,27 @@
             <a:buNone/>
           </a:pPr>
           <a:r>
-            <a:rPr lang="en-US" sz="2000" kern="1200" dirty="0"/>
+            <a:rPr lang="en-US" sz="1800" kern="1200" dirty="0"/>
             <a:t>-Refresher Training</a:t>
           </a:r>
         </a:p>
         <a:p>
-          <a:pPr marL="0" lvl="0" indent="0" algn="l" defTabSz="889000">
+          <a:pPr marL="0" lvl="0" indent="0" algn="l" defTabSz="800100">
+            <a:lnSpc>
+              <a:spcPct val="90000"/>
+            </a:lnSpc>
+            <a:spcBef>
+              <a:spcPct val="0"/>
+            </a:spcBef>
+            <a:spcAft>
+              <a:spcPct val="35000"/>
+            </a:spcAft>
+            <a:buNone/>
+          </a:pPr>
+          <a:endParaRPr lang="en-US" sz="1800" kern="1200" dirty="0"/>
+        </a:p>
+        <a:p>
+          <a:pPr marL="0" lvl="0" indent="0" algn="l" defTabSz="800100">
             <a:lnSpc>
               <a:spcPct val="90000"/>
             </a:lnSpc>
@@ -5094,14 +5566,14 @@
             <a:buNone/>
           </a:pPr>
           <a:r>
-            <a:rPr lang="en-US" sz="2000" kern="1200" dirty="0"/>
+            <a:rPr lang="en-US" sz="1800" kern="1200" dirty="0"/>
             <a:t>-Knowledge Transfer</a:t>
           </a:r>
         </a:p>
       </dsp:txBody>
       <dsp:txXfrm>
-        <a:off x="6782145" y="2467365"/>
-        <a:ext cx="3173541" cy="1649381"/>
+        <a:off x="6791729" y="2299921"/>
+        <a:ext cx="3173541" cy="2340466"/>
       </dsp:txXfrm>
     </dsp:sp>
   </dsp:spTree>
@@ -8976,7 +9448,7 @@
           <a:p>
             <a:fld id="{B80D95BA-7ABD-45D4-B691-9F58B13542F8}" type="datetimeFigureOut">
               <a:rPr lang="en-US" smtClean="0"/>
-              <a:t>4/20/2025</a:t>
+              <a:t>4/21/2025</a:t>
             </a:fld>
             <a:endParaRPr lang="en-US"/>
           </a:p>
@@ -9153,7 +9625,7 @@
           <a:p>
             <a:fld id="{599D14A6-BAC8-4A71-919C-314181CF34EF}" type="datetimeFigureOut">
               <a:rPr lang="en-US" smtClean="0"/>
-              <a:t>4/20/2025</a:t>
+              <a:t>4/21/2025</a:t>
             </a:fld>
             <a:endParaRPr lang="en-US"/>
           </a:p>
@@ -9465,7 +9937,7 @@
           <a:lstStyle/>
           <a:p>
             <a:r>
-              <a:rPr lang="en-US">
+              <a:rPr lang="en-US" dirty="0">
                 <a:ea typeface="Calibri"/>
                 <a:cs typeface="Calibri"/>
               </a:rPr>
@@ -9474,7 +9946,7 @@
           </a:p>
           <a:p>
             <a:r>
-              <a:rPr lang="en-US">
+              <a:rPr lang="en-US" dirty="0">
                 <a:ea typeface="Calibri"/>
                 <a:cs typeface="Calibri"/>
               </a:rPr>
@@ -9488,62 +9960,8 @@
             </a:endParaRPr>
           </a:p>
           <a:p>
-            <a:r>
-              <a:rPr lang="en-US">
-                <a:ea typeface="Calibri"/>
-                <a:cs typeface="Calibri"/>
-              </a:rPr>
-              <a:t>Speaking Points</a:t>
-            </a:r>
-          </a:p>
-          <a:p>
-            <a:endParaRPr lang="en-US">
-              <a:ea typeface="Calibri"/>
-              <a:cs typeface="Calibri"/>
-            </a:endParaRPr>
-          </a:p>
-          <a:p>
-            <a:r>
-              <a:rPr lang="en-US"/>
-              <a:t>Good evening everyone! Our goal today is to provide a detailed story and demonstrate the value we've delivered in this sprint. We'll focus on how these deliverables contribute to the overall project objectives. </a:t>
-            </a:r>
-            <a:endParaRPr lang="en-US">
-              <a:ea typeface="Calibri"/>
-              <a:cs typeface="Calibri"/>
-            </a:endParaRPr>
-          </a:p>
-          <a:p>
-            <a:endParaRPr lang="en-US">
-              <a:ea typeface="Calibri"/>
-              <a:cs typeface="Calibri"/>
-            </a:endParaRPr>
-          </a:p>
-          <a:p>
-            <a:r>
-              <a:rPr lang="en-US">
-                <a:ea typeface="Calibri"/>
-                <a:cs typeface="Calibri"/>
-              </a:rPr>
-              <a:t>The value delivered in this Sprint will be realized in future construction of our IS for Stephanie.  Once created and implemented our it will save her an estimated 200 hours annually in Inventory Management, Sales and Order Processing, Financial Reporting and Customer Communication.</a:t>
-            </a:r>
             <a:br>
-              <a:rPr lang="en-US">
-                <a:ea typeface="Calibri"/>
-                <a:cs typeface="+mn-lt"/>
-              </a:rPr>
-            </a:br>
-            <a:endParaRPr lang="en-US">
-              <a:ea typeface="Calibri"/>
-              <a:cs typeface="Calibri"/>
-            </a:endParaRPr>
-          </a:p>
-          <a:p>
-            <a:r>
-              <a:rPr lang="en-US"/>
-              <a:t>This time can be reinvested into product creation, marketing, and business growth.  We expect Stephanie to increase sales by 20% within the first year of implementing the IS we are creating for her this semester</a:t>
-            </a:r>
-            <a:br>
-              <a:rPr lang="en-US">
+              <a:rPr lang="en-US" dirty="0">
                 <a:ea typeface="Calibri"/>
                 <a:cs typeface="+mn-lt"/>
               </a:rPr>
@@ -9654,16 +10072,16 @@
           <a:lstStyle/>
           <a:p>
             <a:r>
-              <a:rPr lang="en-US">
+              <a:rPr lang="en-US" dirty="0">
                 <a:ea typeface="Calibri"/>
                 <a:cs typeface="Calibri"/>
               </a:rPr>
-              <a:t>Presenter:  Lauren</a:t>
+              <a:t>Presenter:  Hannah</a:t>
             </a:r>
           </a:p>
           <a:p>
             <a:r>
-              <a:rPr lang="en-US">
+              <a:rPr lang="en-US" dirty="0">
                 <a:ea typeface="Calibri"/>
                 <a:cs typeface="Calibri"/>
               </a:rPr>
@@ -9671,29 +10089,13 @@
             </a:r>
           </a:p>
           <a:p>
-            <a:endParaRPr lang="en-US">
+            <a:endParaRPr lang="en-US" dirty="0">
               <a:ea typeface="Calibri"/>
               <a:cs typeface="Calibri"/>
             </a:endParaRPr>
           </a:p>
           <a:p>
-            <a:r>
-              <a:rPr lang="en-US"/>
-              <a:t>Next, we'll look at the Entity Relationship Diagram (ERD).  The ERD provides a clear picture of the data entities and their relationships.</a:t>
-            </a:r>
-          </a:p>
-          <a:p>
-            <a:endParaRPr lang="en-US">
-              <a:ea typeface="Calibri"/>
-              <a:cs typeface="Calibri"/>
-            </a:endParaRPr>
-          </a:p>
-          <a:p>
-            <a:r>
-              <a:rPr lang="en-US"/>
-              <a:t>The ERD is a key foundation for our database design. It ensures data consistency and reduces redundancy. </a:t>
-            </a:r>
-            <a:endParaRPr lang="en-US">
+            <a:endParaRPr lang="en-US" dirty="0">
               <a:ea typeface="Calibri"/>
               <a:cs typeface="Calibri"/>
             </a:endParaRPr>
@@ -9805,16 +10207,16 @@
           <a:lstStyle/>
           <a:p>
             <a:r>
-              <a:rPr lang="en-US">
+              <a:rPr lang="en-US" dirty="0">
                 <a:ea typeface="Calibri"/>
                 <a:cs typeface="Calibri"/>
               </a:rPr>
-              <a:t>Presenter:  Heather</a:t>
+              <a:t>Presenter:  Hannah</a:t>
             </a:r>
           </a:p>
           <a:p>
             <a:r>
-              <a:rPr lang="en-US">
+              <a:rPr lang="en-US" dirty="0">
                 <a:ea typeface="Calibri"/>
                 <a:cs typeface="Calibri"/>
               </a:rPr>
@@ -9822,79 +10224,13 @@
             </a:r>
           </a:p>
           <a:p>
-            <a:endParaRPr lang="en-US">
+            <a:endParaRPr lang="en-US" dirty="0">
               <a:ea typeface="Calibri"/>
               <a:cs typeface="Calibri"/>
             </a:endParaRPr>
           </a:p>
           <a:p>
-            <a:r>
-              <a:rPr lang="en-US"/>
-              <a:t>This is our Sprint 3 Burn Down Chart. As you can see, we have completed all work for this sprint, and are on target for future sprints.</a:t>
-            </a:r>
-            <a:endParaRPr lang="en-US">
-              <a:ea typeface="Calibri"/>
-              <a:cs typeface="Calibri"/>
-            </a:endParaRPr>
-          </a:p>
-          <a:p>
-            <a:endParaRPr lang="en-US"/>
-          </a:p>
-          <a:p>
-            <a:r>
-              <a:rPr lang="en-US"/>
-              <a:t>I would like to take a moment to explain the spike in activity and effort above the ideal line on our Burn Down Chart.  After completing our assigned backlog items individually, our team decided to collaborate on the best ways to incorporate engaging visuals and feedback received previously into our Sprint 3 work.  </a:t>
-            </a:r>
-            <a:endParaRPr lang="en-US">
-              <a:ea typeface="Calibri"/>
-              <a:cs typeface="Calibri"/>
-            </a:endParaRPr>
-          </a:p>
-          <a:p>
-            <a:endParaRPr lang="en-US"/>
-          </a:p>
-          <a:p>
-            <a:r>
-              <a:rPr lang="en-US"/>
-              <a:t>We hope our efforts led to stronger a presentation and delivery for you tonight.</a:t>
-            </a:r>
-            <a:br>
-              <a:rPr lang="en-US">
-                <a:ea typeface="Calibri"/>
-                <a:cs typeface="+mn-lt"/>
-              </a:rPr>
-            </a:br>
-            <a:br>
-              <a:rPr lang="en-US">
-                <a:ea typeface="Calibri"/>
-                <a:cs typeface="+mn-lt"/>
-              </a:rPr>
-            </a:br>
-            <a:r>
-              <a:rPr lang="en-US">
-                <a:ea typeface="Calibri"/>
-                <a:cs typeface="Calibri"/>
-              </a:rPr>
-              <a:t>We also hope you enjoyed the story we told tonight as we focused on the benefits of deliverables and work for our team and our client</a:t>
-            </a:r>
-          </a:p>
-          <a:p>
-            <a:endParaRPr lang="en-US">
-              <a:ea typeface="Calibri"/>
-              <a:cs typeface="Calibri"/>
-            </a:endParaRPr>
-          </a:p>
-          <a:p>
-            <a:r>
-              <a:rPr lang="en-US">
-                <a:ea typeface="Calibri"/>
-                <a:cs typeface="Calibri"/>
-              </a:rPr>
-              <a:t>Lastly tonight, </a:t>
-            </a:r>
-          </a:p>
-          <a:p>
-            <a:endParaRPr lang="en-US">
+            <a:endParaRPr lang="en-US" dirty="0">
               <a:ea typeface="Calibri"/>
               <a:cs typeface="Calibri"/>
             </a:endParaRPr>
@@ -10006,16 +10342,16 @@
           <a:lstStyle/>
           <a:p>
             <a:r>
-              <a:rPr lang="en-US">
+              <a:rPr lang="en-US" dirty="0">
                 <a:ea typeface="Calibri"/>
                 <a:cs typeface="Calibri"/>
               </a:rPr>
-              <a:t>Presenter:  Heather</a:t>
+              <a:t>Presenter:  Hannah</a:t>
             </a:r>
           </a:p>
           <a:p>
             <a:r>
-              <a:rPr lang="en-US">
+              <a:rPr lang="en-US" dirty="0">
                 <a:ea typeface="Calibri"/>
                 <a:cs typeface="Calibri"/>
               </a:rPr>
@@ -10023,79 +10359,19 @@
             </a:r>
           </a:p>
           <a:p>
-            <a:endParaRPr lang="en-US">
+            <a:endParaRPr lang="en-US" dirty="0">
               <a:ea typeface="Calibri"/>
               <a:cs typeface="Calibri"/>
             </a:endParaRPr>
           </a:p>
           <a:p>
-            <a:r>
-              <a:rPr lang="en-US"/>
-              <a:t>This is our Sprint 3 Burn Down Chart. As you can see, we have completed all work for this sprint, and are on target for future sprints.</a:t>
-            </a:r>
-            <a:endParaRPr lang="en-US">
+            <a:endParaRPr lang="en-US" dirty="0">
               <a:ea typeface="Calibri"/>
               <a:cs typeface="Calibri"/>
             </a:endParaRPr>
           </a:p>
           <a:p>
-            <a:endParaRPr lang="en-US"/>
-          </a:p>
-          <a:p>
-            <a:r>
-              <a:rPr lang="en-US"/>
-              <a:t>I would like to take a moment to explain the spike in activity and effort above the ideal line on our Burn Down Chart.  After completing our assigned backlog items individually, our team decided to collaborate on the best ways to incorporate engaging visuals and feedback received previously into our Sprint 3 work.  </a:t>
-            </a:r>
-            <a:endParaRPr lang="en-US">
-              <a:ea typeface="Calibri"/>
-              <a:cs typeface="Calibri"/>
-            </a:endParaRPr>
-          </a:p>
-          <a:p>
-            <a:endParaRPr lang="en-US"/>
-          </a:p>
-          <a:p>
-            <a:r>
-              <a:rPr lang="en-US"/>
-              <a:t>We hope our efforts led to stronger a presentation and delivery for you tonight.</a:t>
-            </a:r>
-            <a:br>
-              <a:rPr lang="en-US">
-                <a:ea typeface="Calibri"/>
-                <a:cs typeface="+mn-lt"/>
-              </a:rPr>
-            </a:br>
-            <a:br>
-              <a:rPr lang="en-US">
-                <a:ea typeface="Calibri"/>
-                <a:cs typeface="+mn-lt"/>
-              </a:rPr>
-            </a:br>
-            <a:r>
-              <a:rPr lang="en-US">
-                <a:ea typeface="Calibri"/>
-                <a:cs typeface="Calibri"/>
-              </a:rPr>
-              <a:t>We also hope you enjoyed the story we told tonight as we focused on the benefits of deliverables and work for our team and our client</a:t>
-            </a:r>
-          </a:p>
-          <a:p>
-            <a:endParaRPr lang="en-US">
-              <a:ea typeface="Calibri"/>
-              <a:cs typeface="Calibri"/>
-            </a:endParaRPr>
-          </a:p>
-          <a:p>
-            <a:r>
-              <a:rPr lang="en-US">
-                <a:ea typeface="Calibri"/>
-                <a:cs typeface="Calibri"/>
-              </a:rPr>
-              <a:t>Lastly tonight, </a:t>
-            </a:r>
-          </a:p>
-          <a:p>
-            <a:endParaRPr lang="en-US">
+            <a:endParaRPr lang="en-US" dirty="0">
               <a:ea typeface="Calibri"/>
               <a:cs typeface="Calibri"/>
             </a:endParaRPr>
@@ -10207,16 +10483,16 @@
           <a:lstStyle/>
           <a:p>
             <a:r>
-              <a:rPr lang="en-US">
+              <a:rPr lang="en-US" dirty="0">
                 <a:ea typeface="Calibri"/>
                 <a:cs typeface="Calibri"/>
               </a:rPr>
-              <a:t>Presenter:  Heather</a:t>
+              <a:t>Presenter:  Hannah</a:t>
             </a:r>
           </a:p>
           <a:p>
             <a:r>
-              <a:rPr lang="en-US">
+              <a:rPr lang="en-US" dirty="0">
                 <a:ea typeface="Calibri"/>
                 <a:cs typeface="Calibri"/>
               </a:rPr>
@@ -10224,79 +10500,19 @@
             </a:r>
           </a:p>
           <a:p>
-            <a:endParaRPr lang="en-US">
+            <a:endParaRPr lang="en-US" dirty="0">
               <a:ea typeface="Calibri"/>
               <a:cs typeface="Calibri"/>
             </a:endParaRPr>
           </a:p>
           <a:p>
-            <a:r>
-              <a:rPr lang="en-US"/>
-              <a:t>This is our Sprint 3 Burn Down Chart. As you can see, we have completed all work for this sprint, and are on target for future sprints.</a:t>
-            </a:r>
-            <a:endParaRPr lang="en-US">
+            <a:endParaRPr lang="en-US" dirty="0">
               <a:ea typeface="Calibri"/>
               <a:cs typeface="Calibri"/>
             </a:endParaRPr>
           </a:p>
           <a:p>
-            <a:endParaRPr lang="en-US"/>
-          </a:p>
-          <a:p>
-            <a:r>
-              <a:rPr lang="en-US"/>
-              <a:t>I would like to take a moment to explain the spike in activity and effort above the ideal line on our Burn Down Chart.  After completing our assigned backlog items individually, our team decided to collaborate on the best ways to incorporate engaging visuals and feedback received previously into our Sprint 3 work.  </a:t>
-            </a:r>
-            <a:endParaRPr lang="en-US">
-              <a:ea typeface="Calibri"/>
-              <a:cs typeface="Calibri"/>
-            </a:endParaRPr>
-          </a:p>
-          <a:p>
-            <a:endParaRPr lang="en-US"/>
-          </a:p>
-          <a:p>
-            <a:r>
-              <a:rPr lang="en-US"/>
-              <a:t>We hope our efforts led to stronger a presentation and delivery for you tonight.</a:t>
-            </a:r>
-            <a:br>
-              <a:rPr lang="en-US">
-                <a:ea typeface="Calibri"/>
-                <a:cs typeface="+mn-lt"/>
-              </a:rPr>
-            </a:br>
-            <a:br>
-              <a:rPr lang="en-US">
-                <a:ea typeface="Calibri"/>
-                <a:cs typeface="+mn-lt"/>
-              </a:rPr>
-            </a:br>
-            <a:r>
-              <a:rPr lang="en-US">
-                <a:ea typeface="Calibri"/>
-                <a:cs typeface="Calibri"/>
-              </a:rPr>
-              <a:t>We also hope you enjoyed the story we told tonight as we focused on the benefits of deliverables and work for our team and our client</a:t>
-            </a:r>
-          </a:p>
-          <a:p>
-            <a:endParaRPr lang="en-US">
-              <a:ea typeface="Calibri"/>
-              <a:cs typeface="Calibri"/>
-            </a:endParaRPr>
-          </a:p>
-          <a:p>
-            <a:r>
-              <a:rPr lang="en-US">
-                <a:ea typeface="Calibri"/>
-                <a:cs typeface="Calibri"/>
-              </a:rPr>
-              <a:t>Lastly tonight, </a:t>
-            </a:r>
-          </a:p>
-          <a:p>
-            <a:endParaRPr lang="en-US">
+            <a:endParaRPr lang="en-US" dirty="0">
               <a:ea typeface="Calibri"/>
               <a:cs typeface="Calibri"/>
             </a:endParaRPr>
@@ -10531,9 +10747,19 @@
           <a:lstStyle/>
           <a:p>
             <a:r>
+              <a:rPr lang="en-US" dirty="0"/>
+              <a:t>Presenter: Heather</a:t>
+            </a:r>
+          </a:p>
+          <a:p>
+            <a:r>
               <a:rPr lang="en-US"/>
-              <a:t>Presenter: Lauren</a:t>
+              <a:t>Transition to next Presenter: NA this slide</a:t>
             </a:r>
+            <a:endParaRPr lang="en-US">
+              <a:ea typeface="Calibri"/>
+              <a:cs typeface="Calibri"/>
+            </a:endParaRPr>
           </a:p>
           <a:p>
             <a:pPr marL="0" marR="0">
@@ -10544,29 +10770,12 @@
                 <a:spcPts val="800"/>
               </a:spcAft>
             </a:pPr>
-            <a:r>
-              <a:rPr lang="en-US"/>
-              <a:t>Transition to next Presenter: NA this slide</a:t>
-            </a:r>
             <a:br>
-              <a:rPr lang="en-US"/>
+              <a:rPr lang="en-US" dirty="0">
+                <a:cs typeface="+mn-lt"/>
+              </a:rPr>
             </a:br>
-            <a:endParaRPr lang="en-US"/>
-          </a:p>
-          <a:p>
-            <a:r>
-              <a:rPr lang="en-US"/>
-              <a:t>This Sprint our team spent extra time reflecting on the feedback received previously.  As a result, we have decided to focus on demonstrating clear communication and iterative progress toward completion of this project for you tonight.  </a:t>
-            </a:r>
-          </a:p>
-          <a:p>
-            <a:endParaRPr lang="en-US"/>
-          </a:p>
-          <a:p>
-            <a:r>
-              <a:rPr lang="en-US"/>
-              <a:t>In terms of deliverables, Sprint 3 was focused on solidifying our understanding of the system's data flow and structure. We've made significant progress in documenting and visualizing these critical aspects.  This sprint was important for laying a solid foundation for the development sprints that follow.</a:t>
-            </a:r>
+            <a:endParaRPr lang="en-US" dirty="0"/>
           </a:p>
           <a:p>
             <a:pPr>
@@ -10577,7 +10786,7 @@
                 <a:spcPts val="800"/>
               </a:spcAft>
             </a:pPr>
-            <a:endParaRPr lang="en-US">
+            <a:endParaRPr lang="en-US" dirty="0">
               <a:ea typeface="Calibri"/>
               <a:cs typeface="+mn-lt"/>
             </a:endParaRPr>
@@ -10683,68 +10892,31 @@
           <a:lstStyle/>
           <a:p>
             <a:r>
-              <a:rPr lang="en-US">
-                <a:ea typeface="Calibri"/>
-                <a:cs typeface="Calibri"/>
-              </a:rPr>
-              <a:t>Presenter:  Lauren</a:t>
+              <a:rPr lang="en-US" dirty="0"/>
+              <a:t>Presenter: Heather</a:t>
             </a:r>
           </a:p>
           <a:p>
             <a:r>
-              <a:rPr lang="en-US">
-                <a:ea typeface="Calibri"/>
-                <a:cs typeface="Calibri"/>
-              </a:rPr>
-              <a:t>Transition to next Presenter:  NA this slide</a:t>
+              <a:rPr lang="en-US" dirty="0"/>
+              <a:t>Transition to next Presenter: NA this slide</a:t>
             </a:r>
-          </a:p>
-          <a:p>
-            <a:endParaRPr lang="en-US">
+            <a:endParaRPr lang="en-US" dirty="0">
               <a:ea typeface="Calibri"/>
               <a:cs typeface="Calibri"/>
             </a:endParaRPr>
           </a:p>
           <a:p>
-            <a:r>
-              <a:rPr lang="en-US"/>
-              <a:t>Let's start with the Data Flow Diagram (DFD) package. This is a crucial deliverable as it visually represents how data moves through the system. We've completed revisions to the Context Diagram and construction the DFD Level 0 and Level 1 for all five of the core processes for the system.</a:t>
-            </a:r>
-            <a:endParaRPr lang="en-US">
+            <a:endParaRPr lang="en-US" dirty="0">
               <a:ea typeface="Calibri"/>
               <a:cs typeface="Calibri"/>
             </a:endParaRPr>
           </a:p>
           <a:p>
-            <a:endParaRPr lang="en-US">
+            <a:endParaRPr lang="en-US" dirty="0">
               <a:ea typeface="Calibri"/>
               <a:cs typeface="Calibri"/>
             </a:endParaRPr>
-          </a:p>
-          <a:p>
-            <a:r>
-              <a:rPr lang="en-US"/>
-              <a:t>We believe the combined 10 hours of time invested in our DFD Package this Sprint will prevent at least 20 hours of rework time in future sprints.</a:t>
-            </a:r>
-            <a:endParaRPr lang="en-US">
-              <a:ea typeface="Calibri"/>
-              <a:cs typeface="Calibri"/>
-            </a:endParaRPr>
-          </a:p>
-          <a:p>
-            <a:endParaRPr lang="en-US">
-              <a:ea typeface="Calibri"/>
-              <a:cs typeface="Calibri"/>
-            </a:endParaRPr>
-          </a:p>
-          <a:p>
-            <a:r>
-              <a:rPr lang="en-US">
-                <a:ea typeface="Calibri"/>
-                <a:cs typeface="Calibri"/>
-              </a:rPr>
-              <a:t>For our client, Stephanie, we believe a well designed IS will save her valuable time that can be invested in other areas to grow her business like creating new product and marketing.</a:t>
-            </a:r>
           </a:p>
         </p:txBody>
       </p:sp>
@@ -10853,58 +11025,30 @@
           <a:lstStyle/>
           <a:p>
             <a:r>
-              <a:rPr lang="en-US"/>
-              <a:t>Presenter: Lauren</a:t>
+              <a:rPr lang="en-US" dirty="0"/>
+              <a:t>Presenter: Heather</a:t>
             </a:r>
           </a:p>
           <a:p>
             <a:r>
-              <a:rPr lang="en-US"/>
+              <a:rPr lang="en-US" dirty="0"/>
               <a:t>Transition to next Presenter: NA this slide</a:t>
             </a:r>
-            <a:endParaRPr lang="en-US">
+            <a:endParaRPr lang="en-US" dirty="0">
               <a:ea typeface="Calibri"/>
               <a:cs typeface="Calibri"/>
             </a:endParaRPr>
           </a:p>
           <a:p>
-            <a:endParaRPr lang="en-US">
+            <a:endParaRPr lang="en-US" dirty="0">
               <a:ea typeface="Calibri"/>
               <a:cs typeface="Calibri"/>
             </a:endParaRPr>
           </a:p>
           <a:p>
-            <a:r>
-              <a:rPr lang="en-US">
-                <a:ea typeface="Calibri"/>
-                <a:cs typeface="Calibri"/>
-              </a:rPr>
-              <a:t>For Sprint 3, we simplified our Context Diagram in order to make it more approachable for Stephanie.  </a:t>
-            </a:r>
-          </a:p>
-          <a:p>
-            <a:endParaRPr lang="en-US">
+            <a:endParaRPr lang="en-US" dirty="0">
               <a:ea typeface="Calibri"/>
               <a:cs typeface="Calibri"/>
-            </a:endParaRPr>
-          </a:p>
-          <a:p>
-            <a:r>
-              <a:rPr lang="en-US"/>
-              <a:t>By investing time in thorough analysis of data flow by providing a clear and concise visual representation, we have reduced the risk of costly errors and ensure that the system meets the needs of Stephanie’s business.  </a:t>
-            </a:r>
-          </a:p>
-          <a:p>
-            <a:endParaRPr lang="en-US"/>
-          </a:p>
-          <a:p>
-            <a:r>
-              <a:rPr lang="en-US"/>
-              <a:t>This level of documentation also facilitates better communication between developers and business stakeholders.  By ensuring Stephanie has a thorough understanding of how data will flow through the IS at this stage, we will decrease the amount of time it takes her to be trained.  There's a strong correlation between client involvement in DFD creation and a quantifiable decrease in the time it takes for them to become comfortable with a new Information System (IS).  Our original estimate of the time frame for Stephanie to become proficient was 2 months.  By leveraging the DFD package, our new estimate cuts that in half to only 1 month.</a:t>
-            </a:r>
-            <a:endParaRPr lang="en-US">
-              <a:ea typeface="Calibri" panose="020F0502020204030204"/>
-              <a:cs typeface="Calibri" panose="020F0502020204030204"/>
             </a:endParaRPr>
           </a:p>
         </p:txBody>
@@ -11014,58 +11158,30 @@
           <a:lstStyle/>
           <a:p>
             <a:r>
-              <a:rPr lang="en-US"/>
-              <a:t>Presenter: Lauren</a:t>
+              <a:rPr lang="en-US" dirty="0"/>
+              <a:t>Presenter: Heather</a:t>
             </a:r>
           </a:p>
           <a:p>
             <a:r>
-              <a:rPr lang="en-US"/>
+              <a:rPr lang="en-US" dirty="0"/>
               <a:t>Transition to next Presenter: NA this slide</a:t>
             </a:r>
-            <a:endParaRPr lang="en-US">
+            <a:endParaRPr lang="en-US" dirty="0">
               <a:ea typeface="Calibri"/>
               <a:cs typeface="Calibri"/>
             </a:endParaRPr>
           </a:p>
           <a:p>
-            <a:endParaRPr lang="en-US">
+            <a:endParaRPr lang="en-US" dirty="0">
               <a:ea typeface="Calibri"/>
               <a:cs typeface="Calibri"/>
             </a:endParaRPr>
           </a:p>
           <a:p>
-            <a:r>
-              <a:rPr lang="en-US">
-                <a:ea typeface="Calibri"/>
-                <a:cs typeface="Calibri"/>
-              </a:rPr>
-              <a:t>For Sprint 3, we simplified our Context Diagram in order to make it more approachable for Stephanie.  </a:t>
-            </a:r>
-          </a:p>
-          <a:p>
-            <a:endParaRPr lang="en-US">
+            <a:endParaRPr lang="en-US" dirty="0">
               <a:ea typeface="Calibri"/>
               <a:cs typeface="Calibri"/>
-            </a:endParaRPr>
-          </a:p>
-          <a:p>
-            <a:r>
-              <a:rPr lang="en-US"/>
-              <a:t>By investing time in thorough analysis of data flow by providing a clear and concise visual representation, we have reduced the risk of costly errors and ensure that the system meets the needs of Stephanie’s business.  </a:t>
-            </a:r>
-          </a:p>
-          <a:p>
-            <a:endParaRPr lang="en-US"/>
-          </a:p>
-          <a:p>
-            <a:r>
-              <a:rPr lang="en-US"/>
-              <a:t>This level of documentation also facilitates better communication between developers and business stakeholders.  By ensuring Stephanie has a thorough understanding of how data will flow through the IS at this stage, we will decrease the amount of time it takes her to be trained.  There's a strong correlation between client involvement in DFD creation and a quantifiable decrease in the time it takes for them to become comfortable with a new Information System (IS).  Our original estimate of the time frame for Stephanie to become proficient was 2 months.  By leveraging the DFD package, our new estimate cuts that in half to only 1 month.</a:t>
-            </a:r>
-            <a:endParaRPr lang="en-US">
-              <a:ea typeface="Calibri" panose="020F0502020204030204"/>
-              <a:cs typeface="Calibri" panose="020F0502020204030204"/>
             </a:endParaRPr>
           </a:p>
         </p:txBody>
@@ -11175,58 +11291,40 @@
           <a:lstStyle/>
           <a:p>
             <a:r>
-              <a:rPr lang="en-US"/>
-              <a:t>Presenter: Lauren</a:t>
+              <a:rPr lang="en-US" dirty="0"/>
+              <a:t>Presenter: Heather</a:t>
             </a:r>
           </a:p>
           <a:p>
             <a:r>
-              <a:rPr lang="en-US"/>
+              <a:rPr lang="en-US" dirty="0"/>
               <a:t>Transition to next Presenter: NA this slide</a:t>
             </a:r>
-            <a:endParaRPr lang="en-US">
-              <a:ea typeface="Calibri"/>
-              <a:cs typeface="Calibri"/>
-            </a:endParaRPr>
-          </a:p>
-          <a:p>
-            <a:endParaRPr lang="en-US">
+            <a:endParaRPr lang="en-US" dirty="0">
               <a:ea typeface="Calibri"/>
               <a:cs typeface="Calibri"/>
             </a:endParaRPr>
           </a:p>
           <a:p>
             <a:r>
-              <a:rPr lang="en-US">
-                <a:ea typeface="Calibri"/>
-                <a:cs typeface="Calibri"/>
-              </a:rPr>
-              <a:t>For Sprint 3, we simplified our Context Diagram in order to make it more approachable for Stephanie.  </a:t>
+              <a:rPr lang="en-US" dirty="0"/>
+              <a:t>Transition to next Presenter: NA this slide</a:t>
             </a:r>
-          </a:p>
-          <a:p>
-            <a:endParaRPr lang="en-US">
+            <a:endParaRPr lang="en-US" dirty="0">
               <a:ea typeface="Calibri"/>
               <a:cs typeface="Calibri"/>
             </a:endParaRPr>
           </a:p>
           <a:p>
-            <a:r>
-              <a:rPr lang="en-US"/>
-              <a:t>By investing time in thorough analysis of data flow by providing a clear and concise visual representation, we have reduced the risk of costly errors and ensure that the system meets the needs of Stephanie’s business.  </a:t>
-            </a:r>
+            <a:endParaRPr lang="en-US" dirty="0">
+              <a:ea typeface="Calibri"/>
+              <a:cs typeface="Calibri"/>
+            </a:endParaRPr>
           </a:p>
           <a:p>
-            <a:endParaRPr lang="en-US"/>
-          </a:p>
-          <a:p>
-            <a:r>
-              <a:rPr lang="en-US"/>
-              <a:t>This level of documentation also facilitates better communication between developers and business stakeholders.  By ensuring Stephanie has a thorough understanding of how data will flow through the IS at this stage, we will decrease the amount of time it takes her to be trained.  There's a strong correlation between client involvement in DFD creation and a quantifiable decrease in the time it takes for them to become comfortable with a new Information System (IS).  Our original estimate of the time frame for Stephanie to become proficient was 2 months.  By leveraging the DFD package, our new estimate cuts that in half to only 1 month.</a:t>
-            </a:r>
-            <a:endParaRPr lang="en-US">
-              <a:ea typeface="Calibri" panose="020F0502020204030204"/>
-              <a:cs typeface="Calibri" panose="020F0502020204030204"/>
+            <a:endParaRPr lang="en-US" dirty="0">
+              <a:ea typeface="Calibri"/>
+              <a:cs typeface="Calibri"/>
             </a:endParaRPr>
           </a:p>
         </p:txBody>
@@ -11336,58 +11434,30 @@
           <a:lstStyle/>
           <a:p>
             <a:r>
-              <a:rPr lang="en-US"/>
-              <a:t>Presenter: Lauren</a:t>
+              <a:rPr lang="en-US" dirty="0"/>
+              <a:t>Presenter: Heather</a:t>
             </a:r>
           </a:p>
           <a:p>
             <a:r>
-              <a:rPr lang="en-US"/>
+              <a:rPr lang="en-US" dirty="0"/>
               <a:t>Transition to next Presenter: NA this slide</a:t>
             </a:r>
-            <a:endParaRPr lang="en-US">
+            <a:endParaRPr lang="en-US" dirty="0">
               <a:ea typeface="Calibri"/>
               <a:cs typeface="Calibri"/>
             </a:endParaRPr>
           </a:p>
           <a:p>
-            <a:endParaRPr lang="en-US">
+            <a:endParaRPr lang="en-US" dirty="0">
               <a:ea typeface="Calibri"/>
               <a:cs typeface="Calibri"/>
             </a:endParaRPr>
           </a:p>
           <a:p>
-            <a:r>
-              <a:rPr lang="en-US">
-                <a:ea typeface="Calibri"/>
-                <a:cs typeface="Calibri"/>
-              </a:rPr>
-              <a:t>For Sprint 3, we simplified our Context Diagram in order to make it more approachable for Stephanie.  </a:t>
-            </a:r>
-          </a:p>
-          <a:p>
-            <a:endParaRPr lang="en-US">
+            <a:endParaRPr lang="en-US" dirty="0">
               <a:ea typeface="Calibri"/>
               <a:cs typeface="Calibri"/>
-            </a:endParaRPr>
-          </a:p>
-          <a:p>
-            <a:r>
-              <a:rPr lang="en-US"/>
-              <a:t>By investing time in thorough analysis of data flow by providing a clear and concise visual representation, we have reduced the risk of costly errors and ensure that the system meets the needs of Stephanie’s business.  </a:t>
-            </a:r>
-          </a:p>
-          <a:p>
-            <a:endParaRPr lang="en-US"/>
-          </a:p>
-          <a:p>
-            <a:r>
-              <a:rPr lang="en-US"/>
-              <a:t>This level of documentation also facilitates better communication between developers and business stakeholders.  By ensuring Stephanie has a thorough understanding of how data will flow through the IS at this stage, we will decrease the amount of time it takes her to be trained.  There's a strong correlation between client involvement in DFD creation and a quantifiable decrease in the time it takes for them to become comfortable with a new Information System (IS).  Our original estimate of the time frame for Stephanie to become proficient was 2 months.  By leveraging the DFD package, our new estimate cuts that in half to only 1 month.</a:t>
-            </a:r>
-            <a:endParaRPr lang="en-US">
-              <a:ea typeface="Calibri" panose="020F0502020204030204"/>
-              <a:cs typeface="Calibri" panose="020F0502020204030204"/>
             </a:endParaRPr>
           </a:p>
         </p:txBody>
@@ -11477,6 +11547,22 @@
         <p:txBody>
           <a:bodyPr/>
           <a:lstStyle/>
+          <a:p>
+            <a:r>
+              <a:rPr lang="en-US" dirty="0"/>
+              <a:t>Presenter: Lauren</a:t>
+            </a:r>
+          </a:p>
+          <a:p>
+            <a:r>
+              <a:rPr lang="en-US" dirty="0"/>
+              <a:t>Transition to next Presenter: NA this slide</a:t>
+            </a:r>
+            <a:endParaRPr lang="en-US" dirty="0">
+              <a:ea typeface="Calibri"/>
+              <a:cs typeface="Calibri"/>
+            </a:endParaRPr>
+          </a:p>
           <a:p>
             <a:endParaRPr lang="en-US" dirty="0"/>
           </a:p>
@@ -11581,58 +11667,30 @@
           <a:lstStyle/>
           <a:p>
             <a:r>
-              <a:rPr lang="en-US"/>
+              <a:rPr lang="en-US" dirty="0"/>
               <a:t>Presenter: Lauren</a:t>
             </a:r>
           </a:p>
           <a:p>
             <a:r>
-              <a:rPr lang="en-US"/>
+              <a:rPr lang="en-US" dirty="0"/>
               <a:t>Transition to next Presenter: NA this slide</a:t>
             </a:r>
-            <a:endParaRPr lang="en-US">
+            <a:endParaRPr lang="en-US" dirty="0">
               <a:ea typeface="Calibri"/>
               <a:cs typeface="Calibri"/>
             </a:endParaRPr>
           </a:p>
           <a:p>
-            <a:endParaRPr lang="en-US">
+            <a:endParaRPr lang="en-US" dirty="0">
               <a:ea typeface="Calibri"/>
               <a:cs typeface="Calibri"/>
             </a:endParaRPr>
           </a:p>
           <a:p>
-            <a:r>
-              <a:rPr lang="en-US">
-                <a:ea typeface="Calibri"/>
-                <a:cs typeface="Calibri"/>
-              </a:rPr>
-              <a:t>For Sprint 3, we simplified our Context Diagram in order to make it more approachable for Stephanie.  </a:t>
-            </a:r>
-          </a:p>
-          <a:p>
-            <a:endParaRPr lang="en-US">
+            <a:endParaRPr lang="en-US" dirty="0">
               <a:ea typeface="Calibri"/>
               <a:cs typeface="Calibri"/>
-            </a:endParaRPr>
-          </a:p>
-          <a:p>
-            <a:r>
-              <a:rPr lang="en-US"/>
-              <a:t>By investing time in thorough analysis of data flow by providing a clear and concise visual representation, we have reduced the risk of costly errors and ensure that the system meets the needs of Stephanie’s business.  </a:t>
-            </a:r>
-          </a:p>
-          <a:p>
-            <a:endParaRPr lang="en-US"/>
-          </a:p>
-          <a:p>
-            <a:r>
-              <a:rPr lang="en-US"/>
-              <a:t>This level of documentation also facilitates better communication between developers and business stakeholders.  By ensuring Stephanie has a thorough understanding of how data will flow through the IS at this stage, we will decrease the amount of time it takes her to be trained.  There's a strong correlation between client involvement in DFD creation and a quantifiable decrease in the time it takes for them to become comfortable with a new Information System (IS).  Our original estimate of the time frame for Stephanie to become proficient was 2 months.  By leveraging the DFD package, our new estimate cuts that in half to only 1 month.</a:t>
-            </a:r>
-            <a:endParaRPr lang="en-US">
-              <a:ea typeface="Calibri" panose="020F0502020204030204"/>
-              <a:cs typeface="Calibri" panose="020F0502020204030204"/>
             </a:endParaRPr>
           </a:p>
         </p:txBody>
@@ -28462,7 +28520,7 @@
           <a:p>
             <a:fld id="{B78FDAD0-21E9-42D0-8C63-C6563197FC13}" type="datetimeFigureOut">
               <a:rPr lang="en-US" smtClean="0"/>
-              <a:t>4/20/2025</a:t>
+              <a:t>4/21/2025</a:t>
             </a:fld>
             <a:endParaRPr lang="en-US" dirty="0"/>
           </a:p>
@@ -29802,8 +29860,32 @@
 </file>
 
 <file path=ppt/slides/slide13.xml><?xml version="1.0" encoding="utf-8"?>
-<p:sld xmlns:a="http://schemas.openxmlformats.org/drawingml/2006/main" xmlns:r="http://schemas.openxmlformats.org/officeDocument/2006/relationships" xmlns:p="http://schemas.openxmlformats.org/presentationml/2006/main" show="0">
+<p:sld xmlns:a="http://schemas.openxmlformats.org/drawingml/2006/main" xmlns:r="http://schemas.openxmlformats.org/officeDocument/2006/relationships" xmlns:p="http://schemas.openxmlformats.org/presentationml/2006/main">
   <p:cSld>
+    <p:bg>
+      <p:bgPr>
+        <a:gradFill rotWithShape="1">
+          <a:gsLst>
+            <a:gs pos="0">
+              <a:schemeClr val="bg2">
+                <a:tint val="94000"/>
+                <a:satMod val="80000"/>
+                <a:lumMod val="106000"/>
+              </a:schemeClr>
+            </a:gs>
+            <a:gs pos="100000">
+              <a:schemeClr val="bg2">
+                <a:shade val="80000"/>
+              </a:schemeClr>
+            </a:gs>
+          </a:gsLst>
+          <a:path path="circle">
+            <a:fillToRect l="43000" r="43000" b="100000"/>
+          </a:path>
+        </a:gradFill>
+        <a:effectLst/>
+      </p:bgPr>
+    </p:bg>
     <p:spTree>
       <p:nvGrpSpPr>
         <p:cNvPr id="1" name="">
@@ -29824,6 +29906,80 @@
           <a:chExt cx="0" cy="0"/>
         </a:xfrm>
       </p:grpSpPr>
+      <p:pic>
+        <p:nvPicPr>
+          <p:cNvPr id="3" name="Picture 2" descr="A screenshot of a computer&#10;&#10;AI-generated content may be incorrect.">
+            <a:extLst>
+              <a:ext uri="{FF2B5EF4-FFF2-40B4-BE49-F238E27FC236}">
+                <a16:creationId xmlns:a16="http://schemas.microsoft.com/office/drawing/2014/main" id="{AB5F41A8-8153-57B6-57CC-BC1BA9FBA260}"/>
+              </a:ext>
+            </a:extLst>
+          </p:cNvPr>
+          <p:cNvPicPr>
+            <a:picLocks noChangeAspect="1"/>
+          </p:cNvPicPr>
+          <p:nvPr/>
+        </p:nvPicPr>
+        <p:blipFill>
+          <a:blip r:embed="rId3"/>
+          <a:stretch>
+            <a:fillRect/>
+          </a:stretch>
+        </p:blipFill>
+        <p:spPr>
+          <a:xfrm>
+            <a:off x="54187" y="1614047"/>
+            <a:ext cx="5759233" cy="2620451"/>
+          </a:xfrm>
+          <a:prstGeom prst="rect">
+            <a:avLst/>
+          </a:prstGeom>
+          <a:effectLst>
+            <a:outerShdw blurRad="50800" dist="38100" dir="2700000" algn="tl" rotWithShape="0">
+              <a:prstClr val="black">
+                <a:alpha val="40000"/>
+              </a:prstClr>
+            </a:outerShdw>
+          </a:effectLst>
+        </p:spPr>
+      </p:pic>
+      <p:pic>
+        <p:nvPicPr>
+          <p:cNvPr id="5" name="Picture 4" descr="A screenshot of a computer&#10;&#10;AI-generated content may be incorrect.">
+            <a:extLst>
+              <a:ext uri="{FF2B5EF4-FFF2-40B4-BE49-F238E27FC236}">
+                <a16:creationId xmlns:a16="http://schemas.microsoft.com/office/drawing/2014/main" id="{5A42C47B-69D6-C7FA-DCF5-0195D45A08D0}"/>
+              </a:ext>
+            </a:extLst>
+          </p:cNvPr>
+          <p:cNvPicPr>
+            <a:picLocks noChangeAspect="1"/>
+          </p:cNvPicPr>
+          <p:nvPr/>
+        </p:nvPicPr>
+        <p:blipFill>
+          <a:blip r:embed="rId4"/>
+          <a:stretch>
+            <a:fillRect/>
+          </a:stretch>
+        </p:blipFill>
+        <p:spPr>
+          <a:xfrm>
+            <a:off x="5888312" y="1614047"/>
+            <a:ext cx="6276531" cy="2620451"/>
+          </a:xfrm>
+          <a:prstGeom prst="rect">
+            <a:avLst/>
+          </a:prstGeom>
+          <a:effectLst>
+            <a:outerShdw blurRad="50800" dist="38100" dir="2700000" algn="tl" rotWithShape="0">
+              <a:prstClr val="black">
+                <a:alpha val="40000"/>
+              </a:prstClr>
+            </a:outerShdw>
+          </a:effectLst>
+        </p:spPr>
+      </p:pic>
     </p:spTree>
     <p:extLst>
       <p:ext uri="{BB962C8B-B14F-4D97-AF65-F5344CB8AC3E}">
@@ -32278,7 +32434,7 @@
           <p:nvPr>
             <p:extLst>
               <p:ext uri="{D42A27DB-BD31-4B8C-83A1-F6EECF244321}">
-                <p14:modId xmlns:p14="http://schemas.microsoft.com/office/powerpoint/2010/main" val="488275812"/>
+                <p14:modId xmlns:p14="http://schemas.microsoft.com/office/powerpoint/2010/main" val="2659879649"/>
               </p:ext>
             </p:extLst>
           </p:nvPr>
@@ -33690,7 +33846,7 @@
         </p:nvSpPr>
         <p:spPr>
           <a:xfrm>
-            <a:off x="3160643" y="1470991"/>
+            <a:off x="3195430" y="1520519"/>
             <a:ext cx="2862470" cy="785192"/>
           </a:xfrm>
           <a:prstGeom prst="rect">
@@ -35824,7 +35980,7 @@
         </p:nvSpPr>
         <p:spPr>
           <a:xfrm>
-            <a:off x="3568149" y="1767840"/>
+            <a:off x="3605773" y="1837443"/>
             <a:ext cx="2159952" cy="863600"/>
           </a:xfrm>
           <a:prstGeom prst="rect">
@@ -37021,13 +37177,13 @@
           <p:nvPr>
             <p:extLst>
               <p:ext uri="{D42A27DB-BD31-4B8C-83A1-F6EECF244321}">
-                <p14:modId xmlns:p14="http://schemas.microsoft.com/office/powerpoint/2010/main" val="3365999890"/>
+                <p14:modId xmlns:p14="http://schemas.microsoft.com/office/powerpoint/2010/main" val="3535414771"/>
               </p:ext>
             </p:extLst>
           </p:nvPr>
         </p:nvGraphicFramePr>
         <p:xfrm>
-          <a:off x="914400" y="542925"/>
+          <a:off x="927237" y="542924"/>
           <a:ext cx="10477499" cy="5207909"/>
         </p:xfrm>
         <a:graphic>
@@ -38018,40 +38174,6 @@
       </p:sp>
       <p:sp>
         <p:nvSpPr>
-          <p:cNvPr id="8" name="TextBox 7">
-            <a:extLst>
-              <a:ext uri="{FF2B5EF4-FFF2-40B4-BE49-F238E27FC236}">
-                <a16:creationId xmlns:a16="http://schemas.microsoft.com/office/drawing/2014/main" id="{0EFB8307-6C3B-1E57-42E2-1548D978FA63}"/>
-              </a:ext>
-            </a:extLst>
-          </p:cNvPr>
-          <p:cNvSpPr txBox="1"/>
-          <p:nvPr/>
-        </p:nvSpPr>
-        <p:spPr>
-          <a:xfrm>
-            <a:off x="3631096" y="1488910"/>
-            <a:ext cx="1908313" cy="715617"/>
-          </a:xfrm>
-          <a:prstGeom prst="rect">
-            <a:avLst/>
-          </a:prstGeom>
-          <a:solidFill>
-            <a:srgbClr val="E9F1F9"/>
-          </a:solidFill>
-        </p:spPr>
-        <p:txBody>
-          <a:bodyPr wrap="square" rtlCol="0">
-            <a:spAutoFit/>
-          </a:bodyPr>
-          <a:lstStyle/>
-          <a:p>
-            <a:endParaRPr lang="en-US" dirty="0"/>
-          </a:p>
-        </p:txBody>
-      </p:sp>
-      <p:sp>
-        <p:nvSpPr>
           <p:cNvPr id="9" name="TextBox 8">
             <a:extLst>
               <a:ext uri="{FF2B5EF4-FFF2-40B4-BE49-F238E27FC236}">
@@ -38202,40 +38324,6 @@
           <a:xfrm>
             <a:off x="8840856" y="3262063"/>
             <a:ext cx="2367170" cy="715617"/>
-          </a:xfrm>
-          <a:prstGeom prst="rect">
-            <a:avLst/>
-          </a:prstGeom>
-          <a:solidFill>
-            <a:srgbClr val="E9F1F9"/>
-          </a:solidFill>
-        </p:spPr>
-        <p:txBody>
-          <a:bodyPr wrap="square" rtlCol="0">
-            <a:spAutoFit/>
-          </a:bodyPr>
-          <a:lstStyle/>
-          <a:p>
-            <a:endParaRPr lang="en-US" dirty="0"/>
-          </a:p>
-        </p:txBody>
-      </p:sp>
-      <p:sp>
-        <p:nvSpPr>
-          <p:cNvPr id="14" name="TextBox 13">
-            <a:extLst>
-              <a:ext uri="{FF2B5EF4-FFF2-40B4-BE49-F238E27FC236}">
-                <a16:creationId xmlns:a16="http://schemas.microsoft.com/office/drawing/2014/main" id="{1D5C4154-82C5-0B09-644C-48D7ACB3CC13}"/>
-              </a:ext>
-            </a:extLst>
-          </p:cNvPr>
-          <p:cNvSpPr txBox="1"/>
-          <p:nvPr/>
-        </p:nvSpPr>
-        <p:spPr>
-          <a:xfrm>
-            <a:off x="3783496" y="1641310"/>
-            <a:ext cx="1908313" cy="715617"/>
           </a:xfrm>
           <a:prstGeom prst="rect">
             <a:avLst/>
@@ -38464,6 +38552,40 @@
           </a:p>
         </p:txBody>
       </p:sp>
+      <p:sp>
+        <p:nvSpPr>
+          <p:cNvPr id="2" name="TextBox 1">
+            <a:extLst>
+              <a:ext uri="{FF2B5EF4-FFF2-40B4-BE49-F238E27FC236}">
+                <a16:creationId xmlns:a16="http://schemas.microsoft.com/office/drawing/2014/main" id="{3502C76E-33F3-6D32-D5AF-4A50FF20CD20}"/>
+              </a:ext>
+            </a:extLst>
+          </p:cNvPr>
+          <p:cNvSpPr txBox="1"/>
+          <p:nvPr/>
+        </p:nvSpPr>
+        <p:spPr>
+          <a:xfrm>
+            <a:off x="3629439" y="1480930"/>
+            <a:ext cx="1908313" cy="715617"/>
+          </a:xfrm>
+          <a:prstGeom prst="rect">
+            <a:avLst/>
+          </a:prstGeom>
+          <a:solidFill>
+            <a:srgbClr val="E9F1F9"/>
+          </a:solidFill>
+        </p:spPr>
+        <p:txBody>
+          <a:bodyPr wrap="square" rtlCol="0">
+            <a:spAutoFit/>
+          </a:bodyPr>
+          <a:lstStyle/>
+          <a:p>
+            <a:endParaRPr lang="en-US" dirty="0"/>
+          </a:p>
+        </p:txBody>
+      </p:sp>
     </p:spTree>
     <p:extLst>
       <p:ext uri="{BB962C8B-B14F-4D97-AF65-F5344CB8AC3E}">
@@ -38557,7 +38679,7 @@
                                       <p:cBhvr>
                                         <p:cTn id="11" dur="500"/>
                                         <p:tgtEl>
-                                          <p:spTgt spid="14"/>
+                                          <p:spTgt spid="2"/>
                                         </p:tgtEl>
                                       </p:cBhvr>
                                     </p:animEffect>
@@ -38569,7 +38691,7 @@
                                           </p:stCondLst>
                                         </p:cTn>
                                         <p:tgtEl>
-                                          <p:spTgt spid="14"/>
+                                          <p:spTgt spid="2"/>
                                         </p:tgtEl>
                                         <p:attrNameLst>
                                           <p:attrName>style.visibility</p:attrName>
@@ -39217,13 +39339,13 @@
       <p:bldP spid="11" grpId="0" animBg="1"/>
       <p:bldP spid="12" grpId="0" animBg="1"/>
       <p:bldP spid="13" grpId="0" animBg="1"/>
-      <p:bldP spid="14" grpId="0" animBg="1"/>
       <p:bldP spid="15" grpId="0" animBg="1"/>
       <p:bldP spid="16" grpId="0" animBg="1"/>
       <p:bldP spid="17" grpId="0" animBg="1"/>
       <p:bldP spid="18" grpId="0" animBg="1"/>
       <p:bldP spid="19" grpId="0" animBg="1"/>
       <p:bldP spid="20" grpId="0" animBg="1"/>
+      <p:bldP spid="2" grpId="0" animBg="1"/>
     </p:bldLst>
   </p:timing>
 </p:sld>
@@ -41818,13 +41940,16 @@
 <file path=customXml/itemProps3.xml><?xml version="1.0" encoding="utf-8"?>
 <ds:datastoreItem xmlns:ds="http://schemas.openxmlformats.org/officeDocument/2006/customXml" ds:itemID="{700FE38A-9F40-477F-8251-8026D8077432}">
   <ds:schemaRefs>
-    <ds:schemaRef ds:uri="230e9df3-be65-4c73-a93b-d1236ebd677e"/>
-    <ds:schemaRef ds:uri="71af3243-3dd4-4a8d-8c0d-dd76da1f02a5"/>
+    <ds:schemaRef ds:uri="http://purl.org/dc/dcmitype/"/>
+    <ds:schemaRef ds:uri="http://purl.org/dc/elements/1.1/"/>
+    <ds:schemaRef ds:uri="http://schemas.openxmlformats.org/package/2006/metadata/core-properties"/>
+    <ds:schemaRef ds:uri="http://www.w3.org/XML/1998/namespace"/>
+    <ds:schemaRef ds:uri="http://schemas.microsoft.com/office/2006/documentManagement/types"/>
+    <ds:schemaRef ds:uri="http://schemas.microsoft.com/office/2006/metadata/properties"/>
+    <ds:schemaRef ds:uri="http://schemas.microsoft.com/office/infopath/2007/PartnerControls"/>
     <ds:schemaRef ds:uri="b76e3f46-95c9-4956-81ce-9b9beefd4658"/>
     <ds:schemaRef ds:uri="c2f317b8-a63e-4b72-958b-1260c8f284fd"/>
-    <ds:schemaRef ds:uri="http://schemas.microsoft.com/office/2006/metadata/properties"/>
-    <ds:schemaRef ds:uri="http://schemas.microsoft.com/office/infopath/2007/PartnerControls"/>
-    <ds:schemaRef ds:uri="http://schemas.microsoft.com/sharepoint/v3"/>
+    <ds:schemaRef ds:uri="http://purl.org/dc/terms/"/>
   </ds:schemaRefs>
 </ds:datastoreItem>
 </file>

</xml_diff>